<commit_message>
Add picture for step3
</commit_message>
<xml_diff>
--- a/assets/step3/step3.pptx
+++ b/assets/step3/step3.pptx
@@ -7,6 +7,10 @@
   <p:sldIdLst>
     <p:sldId id="256" r:id="rId2"/>
     <p:sldId id="257" r:id="rId3"/>
+    <p:sldId id="258" r:id="rId4"/>
+    <p:sldId id="259" r:id="rId5"/>
+    <p:sldId id="260" r:id="rId6"/>
+    <p:sldId id="261" r:id="rId7"/>
   </p:sldIdLst>
   <p:sldSz cx="12192000" cy="6858000"/>
   <p:notesSz cx="6858000" cy="9144000"/>
@@ -105,6 +109,11 @@
       </a:defRPr>
     </a:lvl9pPr>
   </p:defaultTextStyle>
+  <p:extLst>
+    <p:ext uri="{EFAFB233-063F-42B5-8137-9DF3F51BA10A}">
+      <p15:sldGuideLst xmlns:p15="http://schemas.microsoft.com/office/powerpoint/2012/main"/>
+    </p:ext>
+  </p:extLst>
 </p:presentation>
 </file>
 
@@ -2967,6 +2976,45 @@
       </p:grpSpPr>
       <p:sp>
         <p:nvSpPr>
+          <p:cNvPr id="17" name="Rectangle 16"/>
+          <p:cNvSpPr/>
+          <p:nvPr/>
+        </p:nvSpPr>
+        <p:spPr>
+          <a:xfrm>
+            <a:off x="1901952" y="694944"/>
+            <a:ext cx="8058912" cy="4059936"/>
+          </a:xfrm>
+          <a:prstGeom prst="rect">
+            <a:avLst/>
+          </a:prstGeom>
+          <a:ln w="28575"/>
+        </p:spPr>
+        <p:style>
+          <a:lnRef idx="2">
+            <a:schemeClr val="accent6"/>
+          </a:lnRef>
+          <a:fillRef idx="1">
+            <a:schemeClr val="lt1"/>
+          </a:fillRef>
+          <a:effectRef idx="0">
+            <a:schemeClr val="accent6"/>
+          </a:effectRef>
+          <a:fontRef idx="minor">
+            <a:schemeClr val="dk1"/>
+          </a:fontRef>
+        </p:style>
+        <p:txBody>
+          <a:bodyPr rtlCol="0" anchor="ctr"/>
+          <a:lstStyle/>
+          <a:p>
+            <a:pPr algn="ctr"/>
+            <a:endParaRPr lang="en-US"/>
+          </a:p>
+        </p:txBody>
+      </p:sp>
+      <p:sp>
+        <p:nvSpPr>
           <p:cNvPr id="6" name="สี่เหลี่ยมผืนผ้า 5"/>
           <p:cNvSpPr/>
           <p:nvPr/>
@@ -3454,7 +3502,7 @@
         <p:spPr>
           <a:xfrm>
             <a:off x="7712030" y="1999948"/>
-            <a:ext cx="1024255" cy="338554"/>
+            <a:ext cx="1637500" cy="338554"/>
           </a:xfrm>
           <a:prstGeom prst="rect">
             <a:avLst/>
@@ -3472,12 +3520,32 @@
           <a:lstStyle/>
           <a:p>
             <a:r>
-              <a:rPr lang="en-US" sz="1600" dirty="0" err="1"/>
+              <a:rPr lang="en-US" sz="1600" dirty="0" err="1" smtClean="0"/>
+              <a:t>const</a:t>
+            </a:r>
+            <a:r>
+              <a:rPr lang="en-US" sz="1600" dirty="0" smtClean="0"/>
+              <a:t> </a:t>
+            </a:r>
+            <a:r>
+              <a:rPr lang="en-US" sz="1600" dirty="0" err="1" smtClean="0"/>
               <a:t>todos</a:t>
             </a:r>
             <a:r>
               <a:rPr lang="en-US" sz="1600" dirty="0"/>
-              <a:t>: […]</a:t>
+              <a:t> </a:t>
+            </a:r>
+            <a:r>
+              <a:rPr lang="en-US" sz="1600" dirty="0" smtClean="0"/>
+              <a:t>=</a:t>
+            </a:r>
+            <a:r>
+              <a:rPr lang="en-US" sz="1600" dirty="0" smtClean="0"/>
+              <a:t> </a:t>
+            </a:r>
+            <a:r>
+              <a:rPr lang="en-US" sz="1600" dirty="0"/>
+              <a:t>[…]</a:t>
             </a:r>
           </a:p>
         </p:txBody>
@@ -3494,7 +3562,7 @@
         <p:spPr>
           <a:xfrm flipH="1">
             <a:off x="6933034" y="2338502"/>
-            <a:ext cx="1291124" cy="239861"/>
+            <a:ext cx="1597746" cy="239861"/>
           </a:xfrm>
           <a:prstGeom prst="line">
             <a:avLst/>
@@ -3530,6 +3598,13 @@
   <p:clrMapOvr>
     <a:masterClrMapping/>
   </p:clrMapOvr>
+  <p:timing>
+    <p:tnLst>
+      <p:par>
+        <p:cTn id="1" dur="indefinite" restart="never" nodeType="tmRoot"/>
+      </p:par>
+    </p:tnLst>
+  </p:timing>
 </p:sld>
 </file>
 
@@ -3552,6 +3627,45 @@
       </p:grpSpPr>
       <p:sp>
         <p:nvSpPr>
+          <p:cNvPr id="24" name="Rectangle 23"/>
+          <p:cNvSpPr/>
+          <p:nvPr/>
+        </p:nvSpPr>
+        <p:spPr>
+          <a:xfrm>
+            <a:off x="1901952" y="694944"/>
+            <a:ext cx="8058912" cy="4059936"/>
+          </a:xfrm>
+          <a:prstGeom prst="rect">
+            <a:avLst/>
+          </a:prstGeom>
+          <a:ln w="28575"/>
+        </p:spPr>
+        <p:style>
+          <a:lnRef idx="2">
+            <a:schemeClr val="accent6"/>
+          </a:lnRef>
+          <a:fillRef idx="1">
+            <a:schemeClr val="lt1"/>
+          </a:fillRef>
+          <a:effectRef idx="0">
+            <a:schemeClr val="accent6"/>
+          </a:effectRef>
+          <a:fontRef idx="minor">
+            <a:schemeClr val="dk1"/>
+          </a:fontRef>
+        </p:style>
+        <p:txBody>
+          <a:bodyPr rtlCol="0" anchor="ctr"/>
+          <a:lstStyle/>
+          <a:p>
+            <a:pPr algn="ctr"/>
+            <a:endParaRPr lang="en-US"/>
+          </a:p>
+        </p:txBody>
+      </p:sp>
+      <p:sp>
+        <p:nvSpPr>
           <p:cNvPr id="6" name="สี่เหลี่ยมผืนผ้า 5"/>
           <p:cNvSpPr/>
           <p:nvPr/>
@@ -4057,9 +4171,22 @@
           <a:lstStyle/>
           <a:p>
             <a:r>
-              <a:rPr lang="en-US" sz="1600" dirty="0"/>
+              <a:rPr lang="en-US" sz="1600" dirty="0" err="1"/>
+              <a:t>t</a:t>
+            </a:r>
+            <a:r>
+              <a:rPr lang="en-US" sz="1600" dirty="0" err="1" smtClean="0"/>
+              <a:t>his.state</a:t>
+            </a:r>
+            <a:r>
+              <a:rPr lang="en-US" sz="1600" dirty="0" smtClean="0"/>
+              <a:t> = </a:t>
+            </a:r>
+            <a:r>
+              <a:rPr lang="en-US" sz="1600" dirty="0" smtClean="0"/>
               <a:t>{</a:t>
             </a:r>
+            <a:endParaRPr lang="en-US" sz="1600" dirty="0"/>
           </a:p>
           <a:p>
             <a:r>
@@ -4145,6 +4272,3508 @@
   <p:clrMapOvr>
     <a:masterClrMapping/>
   </p:clrMapOvr>
+  <p:timing>
+    <p:tnLst>
+      <p:par>
+        <p:cTn id="1" dur="indefinite" restart="never" nodeType="tmRoot"/>
+      </p:par>
+    </p:tnLst>
+  </p:timing>
+</p:sld>
+</file>
+
+<file path=ppt/slides/slide3.xml><?xml version="1.0" encoding="utf-8"?>
+<p:sld xmlns:a="http://schemas.openxmlformats.org/drawingml/2006/main" xmlns:r="http://schemas.openxmlformats.org/officeDocument/2006/relationships" xmlns:p="http://schemas.openxmlformats.org/presentationml/2006/main">
+  <p:cSld>
+    <p:spTree>
+      <p:nvGrpSpPr>
+        <p:cNvPr id="1" name=""/>
+        <p:cNvGrpSpPr/>
+        <p:nvPr/>
+      </p:nvGrpSpPr>
+      <p:grpSpPr>
+        <a:xfrm>
+          <a:off x="0" y="0"/>
+          <a:ext cx="0" cy="0"/>
+          <a:chOff x="0" y="0"/>
+          <a:chExt cx="0" cy="0"/>
+        </a:xfrm>
+      </p:grpSpPr>
+      <p:sp>
+        <p:nvSpPr>
+          <p:cNvPr id="24" name="Rectangle 23"/>
+          <p:cNvSpPr/>
+          <p:nvPr/>
+        </p:nvSpPr>
+        <p:spPr>
+          <a:xfrm>
+            <a:off x="1901952" y="694944"/>
+            <a:ext cx="8058912" cy="4059936"/>
+          </a:xfrm>
+          <a:prstGeom prst="rect">
+            <a:avLst/>
+          </a:prstGeom>
+          <a:ln w="28575"/>
+        </p:spPr>
+        <p:style>
+          <a:lnRef idx="2">
+            <a:schemeClr val="accent6"/>
+          </a:lnRef>
+          <a:fillRef idx="1">
+            <a:schemeClr val="lt1"/>
+          </a:fillRef>
+          <a:effectRef idx="0">
+            <a:schemeClr val="accent6"/>
+          </a:effectRef>
+          <a:fontRef idx="minor">
+            <a:schemeClr val="dk1"/>
+          </a:fontRef>
+        </p:style>
+        <p:txBody>
+          <a:bodyPr rtlCol="0" anchor="ctr"/>
+          <a:lstStyle/>
+          <a:p>
+            <a:pPr algn="ctr"/>
+            <a:endParaRPr lang="en-US"/>
+          </a:p>
+        </p:txBody>
+      </p:sp>
+      <p:sp>
+        <p:nvSpPr>
+          <p:cNvPr id="6" name="สี่เหลี่ยมผืนผ้า 5"/>
+          <p:cNvSpPr/>
+          <p:nvPr/>
+        </p:nvSpPr>
+        <p:spPr>
+          <a:xfrm>
+            <a:off x="4152121" y="1604869"/>
+            <a:ext cx="2582249" cy="410549"/>
+          </a:xfrm>
+          <a:prstGeom prst="rect">
+            <a:avLst/>
+          </a:prstGeom>
+          <a:solidFill>
+            <a:schemeClr val="accent1"/>
+          </a:solidFill>
+          <a:ln w="28575">
+            <a:solidFill>
+              <a:schemeClr val="tx1"/>
+            </a:solidFill>
+          </a:ln>
+        </p:spPr>
+        <p:style>
+          <a:lnRef idx="2">
+            <a:schemeClr val="accent1">
+              <a:shade val="50000"/>
+            </a:schemeClr>
+          </a:lnRef>
+          <a:fillRef idx="1">
+            <a:schemeClr val="accent1"/>
+          </a:fillRef>
+          <a:effectRef idx="0">
+            <a:schemeClr val="accent1"/>
+          </a:effectRef>
+          <a:fontRef idx="minor">
+            <a:schemeClr val="lt1"/>
+          </a:fontRef>
+        </p:style>
+        <p:txBody>
+          <a:bodyPr rtlCol="0" anchor="t" anchorCtr="0"/>
+          <a:lstStyle/>
+          <a:p>
+            <a:pPr algn="ctr"/>
+            <a:r>
+              <a:rPr lang="en-US" dirty="0" err="1">
+                <a:solidFill>
+                  <a:schemeClr val="tx1"/>
+                </a:solidFill>
+              </a:rPr>
+              <a:t>TodoApp</a:t>
+            </a:r>
+            <a:endParaRPr lang="en-US" dirty="0">
+              <a:solidFill>
+                <a:schemeClr val="tx1"/>
+              </a:solidFill>
+            </a:endParaRPr>
+          </a:p>
+        </p:txBody>
+      </p:sp>
+      <p:sp>
+        <p:nvSpPr>
+          <p:cNvPr id="11" name="สี่เหลี่ยมผืนผ้า 10"/>
+          <p:cNvSpPr/>
+          <p:nvPr/>
+        </p:nvSpPr>
+        <p:spPr>
+          <a:xfrm>
+            <a:off x="2606350" y="2578364"/>
+            <a:ext cx="2582249" cy="410549"/>
+          </a:xfrm>
+          <a:prstGeom prst="rect">
+            <a:avLst/>
+          </a:prstGeom>
+          <a:solidFill>
+            <a:schemeClr val="accent4"/>
+          </a:solidFill>
+          <a:ln w="28575">
+            <a:solidFill>
+              <a:schemeClr val="tx1"/>
+            </a:solidFill>
+          </a:ln>
+        </p:spPr>
+        <p:style>
+          <a:lnRef idx="2">
+            <a:schemeClr val="accent1">
+              <a:shade val="50000"/>
+            </a:schemeClr>
+          </a:lnRef>
+          <a:fillRef idx="1">
+            <a:schemeClr val="accent1"/>
+          </a:fillRef>
+          <a:effectRef idx="0">
+            <a:schemeClr val="accent1"/>
+          </a:effectRef>
+          <a:fontRef idx="minor">
+            <a:schemeClr val="lt1"/>
+          </a:fontRef>
+        </p:style>
+        <p:txBody>
+          <a:bodyPr rtlCol="0" anchor="t" anchorCtr="0"/>
+          <a:lstStyle/>
+          <a:p>
+            <a:pPr algn="ctr"/>
+            <a:r>
+              <a:rPr lang="en-US" dirty="0" err="1">
+                <a:solidFill>
+                  <a:schemeClr val="tx1"/>
+                </a:solidFill>
+              </a:rPr>
+              <a:t>TodoInput</a:t>
+            </a:r>
+            <a:endParaRPr lang="en-US" dirty="0">
+              <a:solidFill>
+                <a:schemeClr val="tx1"/>
+              </a:solidFill>
+            </a:endParaRPr>
+          </a:p>
+        </p:txBody>
+      </p:sp>
+      <p:sp>
+        <p:nvSpPr>
+          <p:cNvPr id="13" name="สี่เหลี่ยมผืนผ้า 12"/>
+          <p:cNvSpPr/>
+          <p:nvPr/>
+        </p:nvSpPr>
+        <p:spPr>
+          <a:xfrm>
+            <a:off x="5641909" y="2578363"/>
+            <a:ext cx="2582249" cy="410549"/>
+          </a:xfrm>
+          <a:prstGeom prst="rect">
+            <a:avLst/>
+          </a:prstGeom>
+          <a:solidFill>
+            <a:schemeClr val="accent4"/>
+          </a:solidFill>
+          <a:ln w="28575">
+            <a:solidFill>
+              <a:schemeClr val="tx1"/>
+            </a:solidFill>
+          </a:ln>
+        </p:spPr>
+        <p:style>
+          <a:lnRef idx="2">
+            <a:schemeClr val="accent1">
+              <a:shade val="50000"/>
+            </a:schemeClr>
+          </a:lnRef>
+          <a:fillRef idx="1">
+            <a:schemeClr val="accent1"/>
+          </a:fillRef>
+          <a:effectRef idx="0">
+            <a:schemeClr val="accent1"/>
+          </a:effectRef>
+          <a:fontRef idx="minor">
+            <a:schemeClr val="lt1"/>
+          </a:fontRef>
+        </p:style>
+        <p:txBody>
+          <a:bodyPr rtlCol="0" anchor="t" anchorCtr="0"/>
+          <a:lstStyle/>
+          <a:p>
+            <a:pPr algn="ctr"/>
+            <a:r>
+              <a:rPr lang="en-US" dirty="0" err="1">
+                <a:solidFill>
+                  <a:schemeClr val="tx1"/>
+                </a:solidFill>
+              </a:rPr>
+              <a:t>TodoList</a:t>
+            </a:r>
+            <a:endParaRPr lang="en-US" dirty="0">
+              <a:solidFill>
+                <a:schemeClr val="tx1"/>
+              </a:solidFill>
+            </a:endParaRPr>
+          </a:p>
+        </p:txBody>
+      </p:sp>
+      <p:sp>
+        <p:nvSpPr>
+          <p:cNvPr id="14" name="สี่เหลี่ยมผืนผ้า 13"/>
+          <p:cNvSpPr/>
+          <p:nvPr/>
+        </p:nvSpPr>
+        <p:spPr>
+          <a:xfrm>
+            <a:off x="4727315" y="3915751"/>
+            <a:ext cx="1829188" cy="410549"/>
+          </a:xfrm>
+          <a:prstGeom prst="rect">
+            <a:avLst/>
+          </a:prstGeom>
+          <a:solidFill>
+            <a:schemeClr val="accent6">
+              <a:lumMod val="60000"/>
+              <a:lumOff val="40000"/>
+            </a:schemeClr>
+          </a:solidFill>
+          <a:ln w="28575">
+            <a:solidFill>
+              <a:schemeClr val="tx1"/>
+            </a:solidFill>
+          </a:ln>
+        </p:spPr>
+        <p:style>
+          <a:lnRef idx="2">
+            <a:schemeClr val="accent1">
+              <a:shade val="50000"/>
+            </a:schemeClr>
+          </a:lnRef>
+          <a:fillRef idx="1">
+            <a:schemeClr val="accent1"/>
+          </a:fillRef>
+          <a:effectRef idx="0">
+            <a:schemeClr val="accent1"/>
+          </a:effectRef>
+          <a:fontRef idx="minor">
+            <a:schemeClr val="lt1"/>
+          </a:fontRef>
+        </p:style>
+        <p:txBody>
+          <a:bodyPr rtlCol="0" anchor="t" anchorCtr="0"/>
+          <a:lstStyle/>
+          <a:p>
+            <a:pPr algn="ctr"/>
+            <a:r>
+              <a:rPr lang="en-US" dirty="0" err="1">
+                <a:solidFill>
+                  <a:schemeClr val="tx1"/>
+                </a:solidFill>
+              </a:rPr>
+              <a:t>TodoItem</a:t>
+            </a:r>
+            <a:endParaRPr lang="en-US" dirty="0">
+              <a:solidFill>
+                <a:schemeClr val="tx1"/>
+              </a:solidFill>
+            </a:endParaRPr>
+          </a:p>
+        </p:txBody>
+      </p:sp>
+      <p:sp>
+        <p:nvSpPr>
+          <p:cNvPr id="15" name="สี่เหลี่ยมผืนผ้า 14"/>
+          <p:cNvSpPr/>
+          <p:nvPr/>
+        </p:nvSpPr>
+        <p:spPr>
+          <a:xfrm>
+            <a:off x="7436303" y="3915751"/>
+            <a:ext cx="1829188" cy="410549"/>
+          </a:xfrm>
+          <a:prstGeom prst="rect">
+            <a:avLst/>
+          </a:prstGeom>
+          <a:solidFill>
+            <a:schemeClr val="accent6">
+              <a:lumMod val="60000"/>
+              <a:lumOff val="40000"/>
+            </a:schemeClr>
+          </a:solidFill>
+          <a:ln w="28575">
+            <a:solidFill>
+              <a:schemeClr val="tx1"/>
+            </a:solidFill>
+          </a:ln>
+        </p:spPr>
+        <p:style>
+          <a:lnRef idx="2">
+            <a:schemeClr val="accent1">
+              <a:shade val="50000"/>
+            </a:schemeClr>
+          </a:lnRef>
+          <a:fillRef idx="1">
+            <a:schemeClr val="accent1"/>
+          </a:fillRef>
+          <a:effectRef idx="0">
+            <a:schemeClr val="accent1"/>
+          </a:effectRef>
+          <a:fontRef idx="minor">
+            <a:schemeClr val="lt1"/>
+          </a:fontRef>
+        </p:style>
+        <p:txBody>
+          <a:bodyPr rtlCol="0" anchor="t" anchorCtr="0"/>
+          <a:lstStyle/>
+          <a:p>
+            <a:pPr algn="ctr"/>
+            <a:r>
+              <a:rPr lang="en-US" dirty="0" err="1">
+                <a:solidFill>
+                  <a:schemeClr val="tx1"/>
+                </a:solidFill>
+              </a:rPr>
+              <a:t>TodoItem</a:t>
+            </a:r>
+            <a:endParaRPr lang="en-US" dirty="0">
+              <a:solidFill>
+                <a:schemeClr val="tx1"/>
+              </a:solidFill>
+            </a:endParaRPr>
+          </a:p>
+        </p:txBody>
+      </p:sp>
+      <p:sp>
+        <p:nvSpPr>
+          <p:cNvPr id="16" name="ลูกศร: ขวา 15"/>
+          <p:cNvSpPr/>
+          <p:nvPr/>
+        </p:nvSpPr>
+        <p:spPr>
+          <a:xfrm rot="3182500">
+            <a:off x="7528419" y="3331443"/>
+            <a:ext cx="981490" cy="248810"/>
+          </a:xfrm>
+          <a:prstGeom prst="rightArrow">
+            <a:avLst/>
+          </a:prstGeom>
+        </p:spPr>
+        <p:style>
+          <a:lnRef idx="2">
+            <a:schemeClr val="accent1">
+              <a:shade val="50000"/>
+            </a:schemeClr>
+          </a:lnRef>
+          <a:fillRef idx="1">
+            <a:schemeClr val="accent1"/>
+          </a:fillRef>
+          <a:effectRef idx="0">
+            <a:schemeClr val="accent1"/>
+          </a:effectRef>
+          <a:fontRef idx="minor">
+            <a:schemeClr val="lt1"/>
+          </a:fontRef>
+        </p:style>
+        <p:txBody>
+          <a:bodyPr rtlCol="0" anchor="ctr"/>
+          <a:lstStyle/>
+          <a:p>
+            <a:pPr algn="ctr"/>
+            <a:endParaRPr lang="en-US"/>
+          </a:p>
+        </p:txBody>
+      </p:sp>
+      <p:sp>
+        <p:nvSpPr>
+          <p:cNvPr id="18" name="ลูกศร: ขวา 17"/>
+          <p:cNvSpPr/>
+          <p:nvPr/>
+        </p:nvSpPr>
+        <p:spPr>
+          <a:xfrm rot="7118255">
+            <a:off x="5891580" y="3352935"/>
+            <a:ext cx="950125" cy="248810"/>
+          </a:xfrm>
+          <a:prstGeom prst="rightArrow">
+            <a:avLst/>
+          </a:prstGeom>
+        </p:spPr>
+        <p:style>
+          <a:lnRef idx="2">
+            <a:schemeClr val="accent1">
+              <a:shade val="50000"/>
+            </a:schemeClr>
+          </a:lnRef>
+          <a:fillRef idx="1">
+            <a:schemeClr val="accent1"/>
+          </a:fillRef>
+          <a:effectRef idx="0">
+            <a:schemeClr val="accent1"/>
+          </a:effectRef>
+          <a:fontRef idx="minor">
+            <a:schemeClr val="lt1"/>
+          </a:fontRef>
+        </p:style>
+        <p:txBody>
+          <a:bodyPr rtlCol="0" anchor="ctr"/>
+          <a:lstStyle/>
+          <a:p>
+            <a:pPr algn="ctr"/>
+            <a:endParaRPr lang="en-US"/>
+          </a:p>
+        </p:txBody>
+      </p:sp>
+      <p:sp>
+        <p:nvSpPr>
+          <p:cNvPr id="19" name="กล่องข้อความ 18"/>
+          <p:cNvSpPr txBox="1"/>
+          <p:nvPr/>
+        </p:nvSpPr>
+        <p:spPr>
+          <a:xfrm>
+            <a:off x="6608442" y="2988910"/>
+            <a:ext cx="1173290" cy="769441"/>
+          </a:xfrm>
+          <a:prstGeom prst="rect">
+            <a:avLst/>
+          </a:prstGeom>
+          <a:noFill/>
+        </p:spPr>
+        <p:txBody>
+          <a:bodyPr wrap="square" rtlCol="0">
+            <a:spAutoFit/>
+          </a:bodyPr>
+          <a:lstStyle/>
+          <a:p>
+            <a:r>
+              <a:rPr lang="en-US" sz="1100" dirty="0"/>
+              <a:t>{</a:t>
+            </a:r>
+          </a:p>
+          <a:p>
+            <a:r>
+              <a:rPr lang="en-US" sz="1100" dirty="0"/>
+              <a:t>  text: “walk”,</a:t>
+            </a:r>
+          </a:p>
+          <a:p>
+            <a:r>
+              <a:rPr lang="en-US" sz="1100" dirty="0"/>
+              <a:t>  status: “active”,</a:t>
+            </a:r>
+          </a:p>
+          <a:p>
+            <a:r>
+              <a:rPr lang="en-US" sz="1100" dirty="0"/>
+              <a:t>}</a:t>
+            </a:r>
+          </a:p>
+        </p:txBody>
+      </p:sp>
+      <p:sp>
+        <p:nvSpPr>
+          <p:cNvPr id="20" name="กล่องข้อความ 19"/>
+          <p:cNvSpPr txBox="1"/>
+          <p:nvPr/>
+        </p:nvSpPr>
+        <p:spPr>
+          <a:xfrm>
+            <a:off x="8350897" y="3000769"/>
+            <a:ext cx="1396585" cy="769441"/>
+          </a:xfrm>
+          <a:prstGeom prst="rect">
+            <a:avLst/>
+          </a:prstGeom>
+          <a:noFill/>
+        </p:spPr>
+        <p:txBody>
+          <a:bodyPr wrap="square" rtlCol="0">
+            <a:spAutoFit/>
+          </a:bodyPr>
+          <a:lstStyle/>
+          <a:p>
+            <a:r>
+              <a:rPr lang="en-US" sz="1100" dirty="0"/>
+              <a:t>{</a:t>
+            </a:r>
+          </a:p>
+          <a:p>
+            <a:r>
+              <a:rPr lang="en-US" sz="1100" dirty="0"/>
+              <a:t>  text: “run”,</a:t>
+            </a:r>
+          </a:p>
+          <a:p>
+            <a:r>
+              <a:rPr lang="en-US" sz="1100" dirty="0"/>
+              <a:t>  status: “complete”,</a:t>
+            </a:r>
+          </a:p>
+          <a:p>
+            <a:r>
+              <a:rPr lang="en-US" sz="1100" dirty="0"/>
+              <a:t>}</a:t>
+            </a:r>
+          </a:p>
+        </p:txBody>
+      </p:sp>
+      <p:sp>
+        <p:nvSpPr>
+          <p:cNvPr id="22" name="กล่องข้อความ 21"/>
+          <p:cNvSpPr txBox="1"/>
+          <p:nvPr/>
+        </p:nvSpPr>
+        <p:spPr>
+          <a:xfrm>
+            <a:off x="7781732" y="956607"/>
+            <a:ext cx="1418717" cy="1077218"/>
+          </a:xfrm>
+          <a:prstGeom prst="rect">
+            <a:avLst/>
+          </a:prstGeom>
+          <a:solidFill>
+            <a:schemeClr val="bg2">
+              <a:lumMod val="90000"/>
+            </a:schemeClr>
+          </a:solidFill>
+        </p:spPr>
+        <p:txBody>
+          <a:bodyPr wrap="square" rtlCol="0">
+            <a:spAutoFit/>
+          </a:bodyPr>
+          <a:lstStyle/>
+          <a:p>
+            <a:r>
+              <a:rPr lang="en-US" sz="1600" dirty="0" err="1"/>
+              <a:t>t</a:t>
+            </a:r>
+            <a:r>
+              <a:rPr lang="en-US" sz="1600" dirty="0" err="1" smtClean="0"/>
+              <a:t>his.state</a:t>
+            </a:r>
+            <a:r>
+              <a:rPr lang="en-US" sz="1600" dirty="0" smtClean="0"/>
+              <a:t> = </a:t>
+            </a:r>
+            <a:r>
+              <a:rPr lang="en-US" sz="1600" dirty="0" smtClean="0"/>
+              <a:t>{</a:t>
+            </a:r>
+            <a:endParaRPr lang="en-US" sz="1600" dirty="0"/>
+          </a:p>
+          <a:p>
+            <a:r>
+              <a:rPr lang="en-US" sz="1600" dirty="0"/>
+              <a:t>  </a:t>
+            </a:r>
+            <a:r>
+              <a:rPr lang="en-US" sz="1600" dirty="0" err="1"/>
+              <a:t>newTodo</a:t>
+            </a:r>
+            <a:r>
+              <a:rPr lang="en-US" sz="1600" dirty="0"/>
+              <a:t>: ‘’</a:t>
+            </a:r>
+          </a:p>
+          <a:p>
+            <a:r>
+              <a:rPr lang="en-US" sz="1600" dirty="0"/>
+              <a:t>  </a:t>
+            </a:r>
+            <a:r>
+              <a:rPr lang="en-US" sz="1600" dirty="0" err="1"/>
+              <a:t>todos</a:t>
+            </a:r>
+            <a:r>
+              <a:rPr lang="en-US" sz="1600" dirty="0"/>
+              <a:t>: […]</a:t>
+            </a:r>
+          </a:p>
+          <a:p>
+            <a:r>
+              <a:rPr lang="en-US" sz="1600" dirty="0"/>
+              <a:t>}</a:t>
+            </a:r>
+          </a:p>
+        </p:txBody>
+      </p:sp>
+      <p:cxnSp>
+        <p:nvCxnSpPr>
+          <p:cNvPr id="26" name="ตัวเชื่อมต่อตรง 25"/>
+          <p:cNvCxnSpPr>
+            <a:stCxn id="22" idx="1"/>
+            <a:endCxn id="6" idx="3"/>
+          </p:cNvCxnSpPr>
+          <p:nvPr/>
+        </p:nvCxnSpPr>
+        <p:spPr>
+          <a:xfrm flipH="1">
+            <a:off x="6734370" y="1495216"/>
+            <a:ext cx="1047362" cy="314928"/>
+          </a:xfrm>
+          <a:prstGeom prst="line">
+            <a:avLst/>
+          </a:prstGeom>
+          <a:ln w="28575">
+            <a:solidFill>
+              <a:schemeClr val="tx1"/>
+            </a:solidFill>
+          </a:ln>
+        </p:spPr>
+        <p:style>
+          <a:lnRef idx="1">
+            <a:schemeClr val="accent1"/>
+          </a:lnRef>
+          <a:fillRef idx="0">
+            <a:schemeClr val="accent1"/>
+          </a:fillRef>
+          <a:effectRef idx="0">
+            <a:schemeClr val="accent1"/>
+          </a:effectRef>
+          <a:fontRef idx="minor">
+            <a:schemeClr val="tx1"/>
+          </a:fontRef>
+        </p:style>
+      </p:cxnSp>
+      <p:sp>
+        <p:nvSpPr>
+          <p:cNvPr id="17" name="ลูกศร: ขวา 15"/>
+          <p:cNvSpPr/>
+          <p:nvPr/>
+        </p:nvSpPr>
+        <p:spPr>
+          <a:xfrm rot="3182500">
+            <a:off x="6161984" y="2158091"/>
+            <a:ext cx="536842" cy="267758"/>
+          </a:xfrm>
+          <a:prstGeom prst="rightArrow">
+            <a:avLst/>
+          </a:prstGeom>
+        </p:spPr>
+        <p:style>
+          <a:lnRef idx="2">
+            <a:schemeClr val="accent1">
+              <a:shade val="50000"/>
+            </a:schemeClr>
+          </a:lnRef>
+          <a:fillRef idx="1">
+            <a:schemeClr val="accent1"/>
+          </a:fillRef>
+          <a:effectRef idx="0">
+            <a:schemeClr val="accent1"/>
+          </a:effectRef>
+          <a:fontRef idx="minor">
+            <a:schemeClr val="lt1"/>
+          </a:fontRef>
+        </p:style>
+        <p:txBody>
+          <a:bodyPr rtlCol="0" anchor="ctr"/>
+          <a:lstStyle/>
+          <a:p>
+            <a:pPr algn="ctr"/>
+            <a:endParaRPr lang="en-US"/>
+          </a:p>
+        </p:txBody>
+      </p:sp>
+      <p:sp>
+        <p:nvSpPr>
+          <p:cNvPr id="21" name="กล่องข้อความ 19"/>
+          <p:cNvSpPr txBox="1"/>
+          <p:nvPr/>
+        </p:nvSpPr>
+        <p:spPr>
+          <a:xfrm>
+            <a:off x="6698768" y="2143478"/>
+            <a:ext cx="1396585" cy="338554"/>
+          </a:xfrm>
+          <a:prstGeom prst="rect">
+            <a:avLst/>
+          </a:prstGeom>
+          <a:noFill/>
+        </p:spPr>
+        <p:txBody>
+          <a:bodyPr wrap="square" rtlCol="0">
+            <a:spAutoFit/>
+          </a:bodyPr>
+          <a:lstStyle/>
+          <a:p>
+            <a:r>
+              <a:rPr lang="en-US" sz="1600" dirty="0" err="1" smtClean="0"/>
+              <a:t>todos</a:t>
+            </a:r>
+            <a:r>
+              <a:rPr lang="en-US" sz="1600" dirty="0" smtClean="0"/>
+              <a:t>: [...]</a:t>
+            </a:r>
+            <a:endParaRPr lang="en-US" sz="1600" dirty="0"/>
+          </a:p>
+        </p:txBody>
+      </p:sp>
+    </p:spTree>
+    <p:extLst>
+      <p:ext uri="{BB962C8B-B14F-4D97-AF65-F5344CB8AC3E}">
+        <p14:creationId xmlns:p14="http://schemas.microsoft.com/office/powerpoint/2010/main" val="3183546504"/>
+      </p:ext>
+    </p:extLst>
+  </p:cSld>
+  <p:clrMapOvr>
+    <a:masterClrMapping/>
+  </p:clrMapOvr>
+  <p:timing>
+    <p:tnLst>
+      <p:par>
+        <p:cTn id="1" dur="indefinite" restart="never" nodeType="tmRoot"/>
+      </p:par>
+    </p:tnLst>
+  </p:timing>
+</p:sld>
+</file>
+
+<file path=ppt/slides/slide4.xml><?xml version="1.0" encoding="utf-8"?>
+<p:sld xmlns:a="http://schemas.openxmlformats.org/drawingml/2006/main" xmlns:r="http://schemas.openxmlformats.org/officeDocument/2006/relationships" xmlns:p="http://schemas.openxmlformats.org/presentationml/2006/main">
+  <p:cSld>
+    <p:spTree>
+      <p:nvGrpSpPr>
+        <p:cNvPr id="1" name=""/>
+        <p:cNvGrpSpPr/>
+        <p:nvPr/>
+      </p:nvGrpSpPr>
+      <p:grpSpPr>
+        <a:xfrm>
+          <a:off x="0" y="0"/>
+          <a:ext cx="0" cy="0"/>
+          <a:chOff x="0" y="0"/>
+          <a:chExt cx="0" cy="0"/>
+        </a:xfrm>
+      </p:grpSpPr>
+      <p:sp>
+        <p:nvSpPr>
+          <p:cNvPr id="27" name="Rectangle 26"/>
+          <p:cNvSpPr/>
+          <p:nvPr/>
+        </p:nvSpPr>
+        <p:spPr>
+          <a:xfrm>
+            <a:off x="1901952" y="694944"/>
+            <a:ext cx="8058912" cy="4059936"/>
+          </a:xfrm>
+          <a:prstGeom prst="rect">
+            <a:avLst/>
+          </a:prstGeom>
+          <a:ln w="28575"/>
+        </p:spPr>
+        <p:style>
+          <a:lnRef idx="2">
+            <a:schemeClr val="accent6"/>
+          </a:lnRef>
+          <a:fillRef idx="1">
+            <a:schemeClr val="lt1"/>
+          </a:fillRef>
+          <a:effectRef idx="0">
+            <a:schemeClr val="accent6"/>
+          </a:effectRef>
+          <a:fontRef idx="minor">
+            <a:schemeClr val="dk1"/>
+          </a:fontRef>
+        </p:style>
+        <p:txBody>
+          <a:bodyPr rtlCol="0" anchor="ctr"/>
+          <a:lstStyle/>
+          <a:p>
+            <a:pPr algn="ctr"/>
+            <a:endParaRPr lang="en-US"/>
+          </a:p>
+        </p:txBody>
+      </p:sp>
+      <p:sp>
+        <p:nvSpPr>
+          <p:cNvPr id="6" name="สี่เหลี่ยมผืนผ้า 5"/>
+          <p:cNvSpPr/>
+          <p:nvPr/>
+        </p:nvSpPr>
+        <p:spPr>
+          <a:xfrm>
+            <a:off x="4152121" y="1604869"/>
+            <a:ext cx="2582249" cy="410549"/>
+          </a:xfrm>
+          <a:prstGeom prst="rect">
+            <a:avLst/>
+          </a:prstGeom>
+          <a:solidFill>
+            <a:schemeClr val="accent1"/>
+          </a:solidFill>
+          <a:ln w="28575">
+            <a:solidFill>
+              <a:schemeClr val="tx1"/>
+            </a:solidFill>
+          </a:ln>
+        </p:spPr>
+        <p:style>
+          <a:lnRef idx="2">
+            <a:schemeClr val="accent1">
+              <a:shade val="50000"/>
+            </a:schemeClr>
+          </a:lnRef>
+          <a:fillRef idx="1">
+            <a:schemeClr val="accent1"/>
+          </a:fillRef>
+          <a:effectRef idx="0">
+            <a:schemeClr val="accent1"/>
+          </a:effectRef>
+          <a:fontRef idx="minor">
+            <a:schemeClr val="lt1"/>
+          </a:fontRef>
+        </p:style>
+        <p:txBody>
+          <a:bodyPr rtlCol="0" anchor="t" anchorCtr="0"/>
+          <a:lstStyle/>
+          <a:p>
+            <a:pPr algn="ctr"/>
+            <a:r>
+              <a:rPr lang="en-US" dirty="0" err="1">
+                <a:solidFill>
+                  <a:schemeClr val="tx1"/>
+                </a:solidFill>
+              </a:rPr>
+              <a:t>TodoApp</a:t>
+            </a:r>
+            <a:endParaRPr lang="en-US" dirty="0">
+              <a:solidFill>
+                <a:schemeClr val="tx1"/>
+              </a:solidFill>
+            </a:endParaRPr>
+          </a:p>
+        </p:txBody>
+      </p:sp>
+      <p:sp>
+        <p:nvSpPr>
+          <p:cNvPr id="11" name="สี่เหลี่ยมผืนผ้า 10"/>
+          <p:cNvSpPr/>
+          <p:nvPr/>
+        </p:nvSpPr>
+        <p:spPr>
+          <a:xfrm>
+            <a:off x="2606350" y="2578364"/>
+            <a:ext cx="2582249" cy="410549"/>
+          </a:xfrm>
+          <a:prstGeom prst="rect">
+            <a:avLst/>
+          </a:prstGeom>
+          <a:solidFill>
+            <a:schemeClr val="accent4"/>
+          </a:solidFill>
+          <a:ln w="28575">
+            <a:solidFill>
+              <a:schemeClr val="tx1"/>
+            </a:solidFill>
+          </a:ln>
+        </p:spPr>
+        <p:style>
+          <a:lnRef idx="2">
+            <a:schemeClr val="accent1">
+              <a:shade val="50000"/>
+            </a:schemeClr>
+          </a:lnRef>
+          <a:fillRef idx="1">
+            <a:schemeClr val="accent1"/>
+          </a:fillRef>
+          <a:effectRef idx="0">
+            <a:schemeClr val="accent1"/>
+          </a:effectRef>
+          <a:fontRef idx="minor">
+            <a:schemeClr val="lt1"/>
+          </a:fontRef>
+        </p:style>
+        <p:txBody>
+          <a:bodyPr rtlCol="0" anchor="t" anchorCtr="0"/>
+          <a:lstStyle/>
+          <a:p>
+            <a:pPr algn="ctr"/>
+            <a:r>
+              <a:rPr lang="en-US" dirty="0" err="1">
+                <a:solidFill>
+                  <a:schemeClr val="tx1"/>
+                </a:solidFill>
+              </a:rPr>
+              <a:t>TodoInput</a:t>
+            </a:r>
+            <a:endParaRPr lang="en-US" dirty="0">
+              <a:solidFill>
+                <a:schemeClr val="tx1"/>
+              </a:solidFill>
+            </a:endParaRPr>
+          </a:p>
+        </p:txBody>
+      </p:sp>
+      <p:sp>
+        <p:nvSpPr>
+          <p:cNvPr id="13" name="สี่เหลี่ยมผืนผ้า 12"/>
+          <p:cNvSpPr/>
+          <p:nvPr/>
+        </p:nvSpPr>
+        <p:spPr>
+          <a:xfrm>
+            <a:off x="5641909" y="2578363"/>
+            <a:ext cx="2582249" cy="410549"/>
+          </a:xfrm>
+          <a:prstGeom prst="rect">
+            <a:avLst/>
+          </a:prstGeom>
+          <a:solidFill>
+            <a:schemeClr val="accent4"/>
+          </a:solidFill>
+          <a:ln w="28575">
+            <a:solidFill>
+              <a:schemeClr val="tx1"/>
+            </a:solidFill>
+          </a:ln>
+        </p:spPr>
+        <p:style>
+          <a:lnRef idx="2">
+            <a:schemeClr val="accent1">
+              <a:shade val="50000"/>
+            </a:schemeClr>
+          </a:lnRef>
+          <a:fillRef idx="1">
+            <a:schemeClr val="accent1"/>
+          </a:fillRef>
+          <a:effectRef idx="0">
+            <a:schemeClr val="accent1"/>
+          </a:effectRef>
+          <a:fontRef idx="minor">
+            <a:schemeClr val="lt1"/>
+          </a:fontRef>
+        </p:style>
+        <p:txBody>
+          <a:bodyPr rtlCol="0" anchor="t" anchorCtr="0"/>
+          <a:lstStyle/>
+          <a:p>
+            <a:pPr algn="ctr"/>
+            <a:r>
+              <a:rPr lang="en-US" dirty="0" err="1">
+                <a:solidFill>
+                  <a:schemeClr val="tx1"/>
+                </a:solidFill>
+              </a:rPr>
+              <a:t>TodoList</a:t>
+            </a:r>
+            <a:endParaRPr lang="en-US" dirty="0">
+              <a:solidFill>
+                <a:schemeClr val="tx1"/>
+              </a:solidFill>
+            </a:endParaRPr>
+          </a:p>
+        </p:txBody>
+      </p:sp>
+      <p:sp>
+        <p:nvSpPr>
+          <p:cNvPr id="14" name="สี่เหลี่ยมผืนผ้า 13"/>
+          <p:cNvSpPr/>
+          <p:nvPr/>
+        </p:nvSpPr>
+        <p:spPr>
+          <a:xfrm>
+            <a:off x="4727315" y="3915751"/>
+            <a:ext cx="1829188" cy="410549"/>
+          </a:xfrm>
+          <a:prstGeom prst="rect">
+            <a:avLst/>
+          </a:prstGeom>
+          <a:solidFill>
+            <a:schemeClr val="accent6">
+              <a:lumMod val="60000"/>
+              <a:lumOff val="40000"/>
+            </a:schemeClr>
+          </a:solidFill>
+          <a:ln w="28575">
+            <a:solidFill>
+              <a:schemeClr val="tx1"/>
+            </a:solidFill>
+          </a:ln>
+        </p:spPr>
+        <p:style>
+          <a:lnRef idx="2">
+            <a:schemeClr val="accent1">
+              <a:shade val="50000"/>
+            </a:schemeClr>
+          </a:lnRef>
+          <a:fillRef idx="1">
+            <a:schemeClr val="accent1"/>
+          </a:fillRef>
+          <a:effectRef idx="0">
+            <a:schemeClr val="accent1"/>
+          </a:effectRef>
+          <a:fontRef idx="minor">
+            <a:schemeClr val="lt1"/>
+          </a:fontRef>
+        </p:style>
+        <p:txBody>
+          <a:bodyPr rtlCol="0" anchor="t" anchorCtr="0"/>
+          <a:lstStyle/>
+          <a:p>
+            <a:pPr algn="ctr"/>
+            <a:r>
+              <a:rPr lang="en-US" dirty="0" err="1">
+                <a:solidFill>
+                  <a:schemeClr val="tx1"/>
+                </a:solidFill>
+              </a:rPr>
+              <a:t>TodoItem</a:t>
+            </a:r>
+            <a:endParaRPr lang="en-US" dirty="0">
+              <a:solidFill>
+                <a:schemeClr val="tx1"/>
+              </a:solidFill>
+            </a:endParaRPr>
+          </a:p>
+        </p:txBody>
+      </p:sp>
+      <p:sp>
+        <p:nvSpPr>
+          <p:cNvPr id="15" name="สี่เหลี่ยมผืนผ้า 14"/>
+          <p:cNvSpPr/>
+          <p:nvPr/>
+        </p:nvSpPr>
+        <p:spPr>
+          <a:xfrm>
+            <a:off x="7436303" y="3915751"/>
+            <a:ext cx="1829188" cy="410549"/>
+          </a:xfrm>
+          <a:prstGeom prst="rect">
+            <a:avLst/>
+          </a:prstGeom>
+          <a:solidFill>
+            <a:schemeClr val="accent6">
+              <a:lumMod val="60000"/>
+              <a:lumOff val="40000"/>
+            </a:schemeClr>
+          </a:solidFill>
+          <a:ln w="28575">
+            <a:solidFill>
+              <a:schemeClr val="tx1"/>
+            </a:solidFill>
+          </a:ln>
+        </p:spPr>
+        <p:style>
+          <a:lnRef idx="2">
+            <a:schemeClr val="accent1">
+              <a:shade val="50000"/>
+            </a:schemeClr>
+          </a:lnRef>
+          <a:fillRef idx="1">
+            <a:schemeClr val="accent1"/>
+          </a:fillRef>
+          <a:effectRef idx="0">
+            <a:schemeClr val="accent1"/>
+          </a:effectRef>
+          <a:fontRef idx="minor">
+            <a:schemeClr val="lt1"/>
+          </a:fontRef>
+        </p:style>
+        <p:txBody>
+          <a:bodyPr rtlCol="0" anchor="t" anchorCtr="0"/>
+          <a:lstStyle/>
+          <a:p>
+            <a:pPr algn="ctr"/>
+            <a:r>
+              <a:rPr lang="en-US" dirty="0" err="1">
+                <a:solidFill>
+                  <a:schemeClr val="tx1"/>
+                </a:solidFill>
+              </a:rPr>
+              <a:t>TodoItem</a:t>
+            </a:r>
+            <a:endParaRPr lang="en-US" dirty="0">
+              <a:solidFill>
+                <a:schemeClr val="tx1"/>
+              </a:solidFill>
+            </a:endParaRPr>
+          </a:p>
+        </p:txBody>
+      </p:sp>
+      <p:sp>
+        <p:nvSpPr>
+          <p:cNvPr id="16" name="ลูกศร: ขวา 15"/>
+          <p:cNvSpPr/>
+          <p:nvPr/>
+        </p:nvSpPr>
+        <p:spPr>
+          <a:xfrm rot="3182500">
+            <a:off x="7528419" y="3331443"/>
+            <a:ext cx="981490" cy="248810"/>
+          </a:xfrm>
+          <a:prstGeom prst="rightArrow">
+            <a:avLst/>
+          </a:prstGeom>
+        </p:spPr>
+        <p:style>
+          <a:lnRef idx="2">
+            <a:schemeClr val="accent1">
+              <a:shade val="50000"/>
+            </a:schemeClr>
+          </a:lnRef>
+          <a:fillRef idx="1">
+            <a:schemeClr val="accent1"/>
+          </a:fillRef>
+          <a:effectRef idx="0">
+            <a:schemeClr val="accent1"/>
+          </a:effectRef>
+          <a:fontRef idx="minor">
+            <a:schemeClr val="lt1"/>
+          </a:fontRef>
+        </p:style>
+        <p:txBody>
+          <a:bodyPr rtlCol="0" anchor="ctr"/>
+          <a:lstStyle/>
+          <a:p>
+            <a:pPr algn="ctr"/>
+            <a:endParaRPr lang="en-US"/>
+          </a:p>
+        </p:txBody>
+      </p:sp>
+      <p:sp>
+        <p:nvSpPr>
+          <p:cNvPr id="18" name="ลูกศร: ขวา 17"/>
+          <p:cNvSpPr/>
+          <p:nvPr/>
+        </p:nvSpPr>
+        <p:spPr>
+          <a:xfrm rot="7118255">
+            <a:off x="5891580" y="3352935"/>
+            <a:ext cx="950125" cy="248810"/>
+          </a:xfrm>
+          <a:prstGeom prst="rightArrow">
+            <a:avLst/>
+          </a:prstGeom>
+        </p:spPr>
+        <p:style>
+          <a:lnRef idx="2">
+            <a:schemeClr val="accent1">
+              <a:shade val="50000"/>
+            </a:schemeClr>
+          </a:lnRef>
+          <a:fillRef idx="1">
+            <a:schemeClr val="accent1"/>
+          </a:fillRef>
+          <a:effectRef idx="0">
+            <a:schemeClr val="accent1"/>
+          </a:effectRef>
+          <a:fontRef idx="minor">
+            <a:schemeClr val="lt1"/>
+          </a:fontRef>
+        </p:style>
+        <p:txBody>
+          <a:bodyPr rtlCol="0" anchor="ctr"/>
+          <a:lstStyle/>
+          <a:p>
+            <a:pPr algn="ctr"/>
+            <a:endParaRPr lang="en-US"/>
+          </a:p>
+        </p:txBody>
+      </p:sp>
+      <p:sp>
+        <p:nvSpPr>
+          <p:cNvPr id="19" name="กล่องข้อความ 18"/>
+          <p:cNvSpPr txBox="1"/>
+          <p:nvPr/>
+        </p:nvSpPr>
+        <p:spPr>
+          <a:xfrm>
+            <a:off x="6608442" y="2988910"/>
+            <a:ext cx="1173290" cy="769441"/>
+          </a:xfrm>
+          <a:prstGeom prst="rect">
+            <a:avLst/>
+          </a:prstGeom>
+          <a:noFill/>
+        </p:spPr>
+        <p:txBody>
+          <a:bodyPr wrap="square" rtlCol="0">
+            <a:spAutoFit/>
+          </a:bodyPr>
+          <a:lstStyle/>
+          <a:p>
+            <a:r>
+              <a:rPr lang="en-US" sz="1100" dirty="0"/>
+              <a:t>{</a:t>
+            </a:r>
+          </a:p>
+          <a:p>
+            <a:r>
+              <a:rPr lang="en-US" sz="1100" dirty="0"/>
+              <a:t>  text: “walk”,</a:t>
+            </a:r>
+          </a:p>
+          <a:p>
+            <a:r>
+              <a:rPr lang="en-US" sz="1100" dirty="0"/>
+              <a:t>  status: “active”,</a:t>
+            </a:r>
+          </a:p>
+          <a:p>
+            <a:r>
+              <a:rPr lang="en-US" sz="1100" dirty="0"/>
+              <a:t>}</a:t>
+            </a:r>
+          </a:p>
+        </p:txBody>
+      </p:sp>
+      <p:sp>
+        <p:nvSpPr>
+          <p:cNvPr id="20" name="กล่องข้อความ 19"/>
+          <p:cNvSpPr txBox="1"/>
+          <p:nvPr/>
+        </p:nvSpPr>
+        <p:spPr>
+          <a:xfrm>
+            <a:off x="8350897" y="3000769"/>
+            <a:ext cx="1396585" cy="769441"/>
+          </a:xfrm>
+          <a:prstGeom prst="rect">
+            <a:avLst/>
+          </a:prstGeom>
+          <a:noFill/>
+        </p:spPr>
+        <p:txBody>
+          <a:bodyPr wrap="square" rtlCol="0">
+            <a:spAutoFit/>
+          </a:bodyPr>
+          <a:lstStyle/>
+          <a:p>
+            <a:r>
+              <a:rPr lang="en-US" sz="1100" dirty="0"/>
+              <a:t>{</a:t>
+            </a:r>
+          </a:p>
+          <a:p>
+            <a:r>
+              <a:rPr lang="en-US" sz="1100" dirty="0"/>
+              <a:t>  text: “run”,</a:t>
+            </a:r>
+          </a:p>
+          <a:p>
+            <a:r>
+              <a:rPr lang="en-US" sz="1100" dirty="0"/>
+              <a:t>  status: “complete”,</a:t>
+            </a:r>
+          </a:p>
+          <a:p>
+            <a:r>
+              <a:rPr lang="en-US" sz="1100" dirty="0"/>
+              <a:t>}</a:t>
+            </a:r>
+          </a:p>
+        </p:txBody>
+      </p:sp>
+      <p:sp>
+        <p:nvSpPr>
+          <p:cNvPr id="22" name="กล่องข้อความ 21"/>
+          <p:cNvSpPr txBox="1"/>
+          <p:nvPr/>
+        </p:nvSpPr>
+        <p:spPr>
+          <a:xfrm>
+            <a:off x="7781732" y="956607"/>
+            <a:ext cx="1418717" cy="1077218"/>
+          </a:xfrm>
+          <a:prstGeom prst="rect">
+            <a:avLst/>
+          </a:prstGeom>
+          <a:solidFill>
+            <a:schemeClr val="bg2">
+              <a:lumMod val="90000"/>
+            </a:schemeClr>
+          </a:solidFill>
+        </p:spPr>
+        <p:txBody>
+          <a:bodyPr wrap="square" rtlCol="0">
+            <a:spAutoFit/>
+          </a:bodyPr>
+          <a:lstStyle/>
+          <a:p>
+            <a:r>
+              <a:rPr lang="en-US" sz="1600" dirty="0" err="1"/>
+              <a:t>t</a:t>
+            </a:r>
+            <a:r>
+              <a:rPr lang="en-US" sz="1600" dirty="0" err="1" smtClean="0"/>
+              <a:t>his.state</a:t>
+            </a:r>
+            <a:r>
+              <a:rPr lang="en-US" sz="1600" dirty="0" smtClean="0"/>
+              <a:t> = </a:t>
+            </a:r>
+            <a:r>
+              <a:rPr lang="en-US" sz="1600" dirty="0" smtClean="0"/>
+              <a:t>{</a:t>
+            </a:r>
+            <a:endParaRPr lang="en-US" sz="1600" dirty="0"/>
+          </a:p>
+          <a:p>
+            <a:r>
+              <a:rPr lang="en-US" sz="1600" dirty="0"/>
+              <a:t>  </a:t>
+            </a:r>
+            <a:r>
+              <a:rPr lang="en-US" sz="1600" dirty="0" err="1"/>
+              <a:t>newTodo</a:t>
+            </a:r>
+            <a:r>
+              <a:rPr lang="en-US" sz="1600" dirty="0"/>
+              <a:t>: ‘’</a:t>
+            </a:r>
+          </a:p>
+          <a:p>
+            <a:r>
+              <a:rPr lang="en-US" sz="1600" dirty="0"/>
+              <a:t>  </a:t>
+            </a:r>
+            <a:r>
+              <a:rPr lang="en-US" sz="1600" dirty="0" err="1"/>
+              <a:t>todos</a:t>
+            </a:r>
+            <a:r>
+              <a:rPr lang="en-US" sz="1600" dirty="0"/>
+              <a:t>: […]</a:t>
+            </a:r>
+          </a:p>
+          <a:p>
+            <a:r>
+              <a:rPr lang="en-US" sz="1600" dirty="0"/>
+              <a:t>}</a:t>
+            </a:r>
+          </a:p>
+        </p:txBody>
+      </p:sp>
+      <p:cxnSp>
+        <p:nvCxnSpPr>
+          <p:cNvPr id="26" name="ตัวเชื่อมต่อตรง 25"/>
+          <p:cNvCxnSpPr>
+            <a:stCxn id="22" idx="1"/>
+            <a:endCxn id="6" idx="3"/>
+          </p:cNvCxnSpPr>
+          <p:nvPr/>
+        </p:nvCxnSpPr>
+        <p:spPr>
+          <a:xfrm flipH="1">
+            <a:off x="6734370" y="1495216"/>
+            <a:ext cx="1047362" cy="314928"/>
+          </a:xfrm>
+          <a:prstGeom prst="line">
+            <a:avLst/>
+          </a:prstGeom>
+          <a:ln w="28575">
+            <a:solidFill>
+              <a:schemeClr val="tx1"/>
+            </a:solidFill>
+          </a:ln>
+        </p:spPr>
+        <p:style>
+          <a:lnRef idx="1">
+            <a:schemeClr val="accent1"/>
+          </a:lnRef>
+          <a:fillRef idx="0">
+            <a:schemeClr val="accent1"/>
+          </a:fillRef>
+          <a:effectRef idx="0">
+            <a:schemeClr val="accent1"/>
+          </a:effectRef>
+          <a:fontRef idx="minor">
+            <a:schemeClr val="tx1"/>
+          </a:fontRef>
+        </p:style>
+      </p:cxnSp>
+      <p:sp>
+        <p:nvSpPr>
+          <p:cNvPr id="17" name="ลูกศร: ขวา 15"/>
+          <p:cNvSpPr/>
+          <p:nvPr/>
+        </p:nvSpPr>
+        <p:spPr>
+          <a:xfrm rot="3182500">
+            <a:off x="6161984" y="2158091"/>
+            <a:ext cx="536842" cy="267758"/>
+          </a:xfrm>
+          <a:prstGeom prst="rightArrow">
+            <a:avLst/>
+          </a:prstGeom>
+        </p:spPr>
+        <p:style>
+          <a:lnRef idx="2">
+            <a:schemeClr val="accent1">
+              <a:shade val="50000"/>
+            </a:schemeClr>
+          </a:lnRef>
+          <a:fillRef idx="1">
+            <a:schemeClr val="accent1"/>
+          </a:fillRef>
+          <a:effectRef idx="0">
+            <a:schemeClr val="accent1"/>
+          </a:effectRef>
+          <a:fontRef idx="minor">
+            <a:schemeClr val="lt1"/>
+          </a:fontRef>
+        </p:style>
+        <p:txBody>
+          <a:bodyPr rtlCol="0" anchor="ctr"/>
+          <a:lstStyle/>
+          <a:p>
+            <a:pPr algn="ctr"/>
+            <a:endParaRPr lang="en-US"/>
+          </a:p>
+        </p:txBody>
+      </p:sp>
+      <p:sp>
+        <p:nvSpPr>
+          <p:cNvPr id="21" name="กล่องข้อความ 19"/>
+          <p:cNvSpPr txBox="1"/>
+          <p:nvPr/>
+        </p:nvSpPr>
+        <p:spPr>
+          <a:xfrm>
+            <a:off x="6698768" y="2143478"/>
+            <a:ext cx="1396585" cy="338554"/>
+          </a:xfrm>
+          <a:prstGeom prst="rect">
+            <a:avLst/>
+          </a:prstGeom>
+          <a:noFill/>
+        </p:spPr>
+        <p:txBody>
+          <a:bodyPr wrap="square" rtlCol="0">
+            <a:spAutoFit/>
+          </a:bodyPr>
+          <a:lstStyle/>
+          <a:p>
+            <a:r>
+              <a:rPr lang="en-US" sz="1600" dirty="0" err="1" smtClean="0"/>
+              <a:t>todos</a:t>
+            </a:r>
+            <a:r>
+              <a:rPr lang="en-US" sz="1600" dirty="0" smtClean="0"/>
+              <a:t>: […]</a:t>
+            </a:r>
+            <a:endParaRPr lang="en-US" sz="1600" dirty="0"/>
+          </a:p>
+        </p:txBody>
+      </p:sp>
+      <p:sp>
+        <p:nvSpPr>
+          <p:cNvPr id="23" name="ลูกศร: ขวา 15"/>
+          <p:cNvSpPr/>
+          <p:nvPr/>
+        </p:nvSpPr>
+        <p:spPr>
+          <a:xfrm rot="7533164">
+            <a:off x="4458894" y="2158090"/>
+            <a:ext cx="536842" cy="267758"/>
+          </a:xfrm>
+          <a:prstGeom prst="rightArrow">
+            <a:avLst/>
+          </a:prstGeom>
+        </p:spPr>
+        <p:style>
+          <a:lnRef idx="2">
+            <a:schemeClr val="accent1">
+              <a:shade val="50000"/>
+            </a:schemeClr>
+          </a:lnRef>
+          <a:fillRef idx="1">
+            <a:schemeClr val="accent1"/>
+          </a:fillRef>
+          <a:effectRef idx="0">
+            <a:schemeClr val="accent1"/>
+          </a:effectRef>
+          <a:fontRef idx="minor">
+            <a:schemeClr val="lt1"/>
+          </a:fontRef>
+        </p:style>
+        <p:txBody>
+          <a:bodyPr rtlCol="0" anchor="ctr"/>
+          <a:lstStyle/>
+          <a:p>
+            <a:pPr algn="ctr"/>
+            <a:endParaRPr lang="en-US"/>
+          </a:p>
+        </p:txBody>
+      </p:sp>
+      <p:sp>
+        <p:nvSpPr>
+          <p:cNvPr id="24" name="กล่องข้อความ 19"/>
+          <p:cNvSpPr txBox="1"/>
+          <p:nvPr/>
+        </p:nvSpPr>
+        <p:spPr>
+          <a:xfrm>
+            <a:off x="3330730" y="2125071"/>
+            <a:ext cx="1396585" cy="338554"/>
+          </a:xfrm>
+          <a:prstGeom prst="rect">
+            <a:avLst/>
+          </a:prstGeom>
+          <a:noFill/>
+        </p:spPr>
+        <p:txBody>
+          <a:bodyPr wrap="square" rtlCol="0">
+            <a:spAutoFit/>
+          </a:bodyPr>
+          <a:lstStyle/>
+          <a:p>
+            <a:r>
+              <a:rPr lang="en-US" sz="1600" dirty="0" err="1" smtClean="0"/>
+              <a:t>newTodo</a:t>
+            </a:r>
+            <a:r>
+              <a:rPr lang="en-US" sz="1600" dirty="0" smtClean="0"/>
+              <a:t>: ‘’</a:t>
+            </a:r>
+            <a:endParaRPr lang="en-US" sz="1600" dirty="0"/>
+          </a:p>
+        </p:txBody>
+      </p:sp>
+    </p:spTree>
+    <p:extLst>
+      <p:ext uri="{BB962C8B-B14F-4D97-AF65-F5344CB8AC3E}">
+        <p14:creationId xmlns:p14="http://schemas.microsoft.com/office/powerpoint/2010/main" val="1366572150"/>
+      </p:ext>
+    </p:extLst>
+  </p:cSld>
+  <p:clrMapOvr>
+    <a:masterClrMapping/>
+  </p:clrMapOvr>
+  <p:timing>
+    <p:tnLst>
+      <p:par>
+        <p:cTn id="1" dur="indefinite" restart="never" nodeType="tmRoot"/>
+      </p:par>
+    </p:tnLst>
+  </p:timing>
+</p:sld>
+</file>
+
+<file path=ppt/slides/slide5.xml><?xml version="1.0" encoding="utf-8"?>
+<p:sld xmlns:a="http://schemas.openxmlformats.org/drawingml/2006/main" xmlns:r="http://schemas.openxmlformats.org/officeDocument/2006/relationships" xmlns:p="http://schemas.openxmlformats.org/presentationml/2006/main">
+  <p:cSld>
+    <p:spTree>
+      <p:nvGrpSpPr>
+        <p:cNvPr id="1" name=""/>
+        <p:cNvGrpSpPr/>
+        <p:nvPr/>
+      </p:nvGrpSpPr>
+      <p:grpSpPr>
+        <a:xfrm>
+          <a:off x="0" y="0"/>
+          <a:ext cx="0" cy="0"/>
+          <a:chOff x="0" y="0"/>
+          <a:chExt cx="0" cy="0"/>
+        </a:xfrm>
+      </p:grpSpPr>
+      <p:sp>
+        <p:nvSpPr>
+          <p:cNvPr id="28" name="Rectangle 27"/>
+          <p:cNvSpPr/>
+          <p:nvPr/>
+        </p:nvSpPr>
+        <p:spPr>
+          <a:xfrm>
+            <a:off x="1901952" y="694944"/>
+            <a:ext cx="8058912" cy="4059936"/>
+          </a:xfrm>
+          <a:prstGeom prst="rect">
+            <a:avLst/>
+          </a:prstGeom>
+          <a:ln w="28575"/>
+        </p:spPr>
+        <p:style>
+          <a:lnRef idx="2">
+            <a:schemeClr val="accent6"/>
+          </a:lnRef>
+          <a:fillRef idx="1">
+            <a:schemeClr val="lt1"/>
+          </a:fillRef>
+          <a:effectRef idx="0">
+            <a:schemeClr val="accent6"/>
+          </a:effectRef>
+          <a:fontRef idx="minor">
+            <a:schemeClr val="dk1"/>
+          </a:fontRef>
+        </p:style>
+        <p:txBody>
+          <a:bodyPr rtlCol="0" anchor="ctr"/>
+          <a:lstStyle/>
+          <a:p>
+            <a:pPr algn="ctr"/>
+            <a:endParaRPr lang="en-US"/>
+          </a:p>
+        </p:txBody>
+      </p:sp>
+      <p:sp>
+        <p:nvSpPr>
+          <p:cNvPr id="6" name="สี่เหลี่ยมผืนผ้า 5"/>
+          <p:cNvSpPr/>
+          <p:nvPr/>
+        </p:nvSpPr>
+        <p:spPr>
+          <a:xfrm>
+            <a:off x="4152121" y="1604869"/>
+            <a:ext cx="2582249" cy="410549"/>
+          </a:xfrm>
+          <a:prstGeom prst="rect">
+            <a:avLst/>
+          </a:prstGeom>
+          <a:solidFill>
+            <a:schemeClr val="accent1"/>
+          </a:solidFill>
+          <a:ln w="28575">
+            <a:solidFill>
+              <a:schemeClr val="tx1"/>
+            </a:solidFill>
+          </a:ln>
+        </p:spPr>
+        <p:style>
+          <a:lnRef idx="2">
+            <a:schemeClr val="accent1">
+              <a:shade val="50000"/>
+            </a:schemeClr>
+          </a:lnRef>
+          <a:fillRef idx="1">
+            <a:schemeClr val="accent1"/>
+          </a:fillRef>
+          <a:effectRef idx="0">
+            <a:schemeClr val="accent1"/>
+          </a:effectRef>
+          <a:fontRef idx="minor">
+            <a:schemeClr val="lt1"/>
+          </a:fontRef>
+        </p:style>
+        <p:txBody>
+          <a:bodyPr rtlCol="0" anchor="t" anchorCtr="0"/>
+          <a:lstStyle/>
+          <a:p>
+            <a:pPr algn="ctr"/>
+            <a:r>
+              <a:rPr lang="en-US" dirty="0" err="1">
+                <a:solidFill>
+                  <a:schemeClr val="tx1"/>
+                </a:solidFill>
+              </a:rPr>
+              <a:t>TodoApp</a:t>
+            </a:r>
+            <a:endParaRPr lang="en-US" dirty="0">
+              <a:solidFill>
+                <a:schemeClr val="tx1"/>
+              </a:solidFill>
+            </a:endParaRPr>
+          </a:p>
+        </p:txBody>
+      </p:sp>
+      <p:sp>
+        <p:nvSpPr>
+          <p:cNvPr id="11" name="สี่เหลี่ยมผืนผ้า 10"/>
+          <p:cNvSpPr/>
+          <p:nvPr/>
+        </p:nvSpPr>
+        <p:spPr>
+          <a:xfrm>
+            <a:off x="2606350" y="2578364"/>
+            <a:ext cx="2582249" cy="410549"/>
+          </a:xfrm>
+          <a:prstGeom prst="rect">
+            <a:avLst/>
+          </a:prstGeom>
+          <a:solidFill>
+            <a:schemeClr val="accent4"/>
+          </a:solidFill>
+          <a:ln w="28575">
+            <a:solidFill>
+              <a:schemeClr val="tx1"/>
+            </a:solidFill>
+          </a:ln>
+        </p:spPr>
+        <p:style>
+          <a:lnRef idx="2">
+            <a:schemeClr val="accent1">
+              <a:shade val="50000"/>
+            </a:schemeClr>
+          </a:lnRef>
+          <a:fillRef idx="1">
+            <a:schemeClr val="accent1"/>
+          </a:fillRef>
+          <a:effectRef idx="0">
+            <a:schemeClr val="accent1"/>
+          </a:effectRef>
+          <a:fontRef idx="minor">
+            <a:schemeClr val="lt1"/>
+          </a:fontRef>
+        </p:style>
+        <p:txBody>
+          <a:bodyPr rtlCol="0" anchor="t" anchorCtr="0"/>
+          <a:lstStyle/>
+          <a:p>
+            <a:pPr algn="ctr"/>
+            <a:r>
+              <a:rPr lang="en-US" dirty="0" err="1">
+                <a:solidFill>
+                  <a:schemeClr val="tx1"/>
+                </a:solidFill>
+              </a:rPr>
+              <a:t>TodoInput</a:t>
+            </a:r>
+            <a:endParaRPr lang="en-US" dirty="0">
+              <a:solidFill>
+                <a:schemeClr val="tx1"/>
+              </a:solidFill>
+            </a:endParaRPr>
+          </a:p>
+        </p:txBody>
+      </p:sp>
+      <p:sp>
+        <p:nvSpPr>
+          <p:cNvPr id="13" name="สี่เหลี่ยมผืนผ้า 12"/>
+          <p:cNvSpPr/>
+          <p:nvPr/>
+        </p:nvSpPr>
+        <p:spPr>
+          <a:xfrm>
+            <a:off x="5641909" y="2578363"/>
+            <a:ext cx="2582249" cy="410549"/>
+          </a:xfrm>
+          <a:prstGeom prst="rect">
+            <a:avLst/>
+          </a:prstGeom>
+          <a:solidFill>
+            <a:schemeClr val="accent4"/>
+          </a:solidFill>
+          <a:ln w="28575">
+            <a:solidFill>
+              <a:schemeClr val="tx1"/>
+            </a:solidFill>
+          </a:ln>
+        </p:spPr>
+        <p:style>
+          <a:lnRef idx="2">
+            <a:schemeClr val="accent1">
+              <a:shade val="50000"/>
+            </a:schemeClr>
+          </a:lnRef>
+          <a:fillRef idx="1">
+            <a:schemeClr val="accent1"/>
+          </a:fillRef>
+          <a:effectRef idx="0">
+            <a:schemeClr val="accent1"/>
+          </a:effectRef>
+          <a:fontRef idx="minor">
+            <a:schemeClr val="lt1"/>
+          </a:fontRef>
+        </p:style>
+        <p:txBody>
+          <a:bodyPr rtlCol="0" anchor="t" anchorCtr="0"/>
+          <a:lstStyle/>
+          <a:p>
+            <a:pPr algn="ctr"/>
+            <a:r>
+              <a:rPr lang="en-US" dirty="0" err="1">
+                <a:solidFill>
+                  <a:schemeClr val="tx1"/>
+                </a:solidFill>
+              </a:rPr>
+              <a:t>TodoList</a:t>
+            </a:r>
+            <a:endParaRPr lang="en-US" dirty="0">
+              <a:solidFill>
+                <a:schemeClr val="tx1"/>
+              </a:solidFill>
+            </a:endParaRPr>
+          </a:p>
+        </p:txBody>
+      </p:sp>
+      <p:sp>
+        <p:nvSpPr>
+          <p:cNvPr id="14" name="สี่เหลี่ยมผืนผ้า 13"/>
+          <p:cNvSpPr/>
+          <p:nvPr/>
+        </p:nvSpPr>
+        <p:spPr>
+          <a:xfrm>
+            <a:off x="4727315" y="3915751"/>
+            <a:ext cx="1829188" cy="410549"/>
+          </a:xfrm>
+          <a:prstGeom prst="rect">
+            <a:avLst/>
+          </a:prstGeom>
+          <a:solidFill>
+            <a:schemeClr val="accent6">
+              <a:lumMod val="60000"/>
+              <a:lumOff val="40000"/>
+            </a:schemeClr>
+          </a:solidFill>
+          <a:ln w="28575">
+            <a:solidFill>
+              <a:schemeClr val="tx1"/>
+            </a:solidFill>
+          </a:ln>
+        </p:spPr>
+        <p:style>
+          <a:lnRef idx="2">
+            <a:schemeClr val="accent1">
+              <a:shade val="50000"/>
+            </a:schemeClr>
+          </a:lnRef>
+          <a:fillRef idx="1">
+            <a:schemeClr val="accent1"/>
+          </a:fillRef>
+          <a:effectRef idx="0">
+            <a:schemeClr val="accent1"/>
+          </a:effectRef>
+          <a:fontRef idx="minor">
+            <a:schemeClr val="lt1"/>
+          </a:fontRef>
+        </p:style>
+        <p:txBody>
+          <a:bodyPr rtlCol="0" anchor="t" anchorCtr="0"/>
+          <a:lstStyle/>
+          <a:p>
+            <a:pPr algn="ctr"/>
+            <a:r>
+              <a:rPr lang="en-US" dirty="0" err="1">
+                <a:solidFill>
+                  <a:schemeClr val="tx1"/>
+                </a:solidFill>
+              </a:rPr>
+              <a:t>TodoItem</a:t>
+            </a:r>
+            <a:endParaRPr lang="en-US" dirty="0">
+              <a:solidFill>
+                <a:schemeClr val="tx1"/>
+              </a:solidFill>
+            </a:endParaRPr>
+          </a:p>
+        </p:txBody>
+      </p:sp>
+      <p:sp>
+        <p:nvSpPr>
+          <p:cNvPr id="15" name="สี่เหลี่ยมผืนผ้า 14"/>
+          <p:cNvSpPr/>
+          <p:nvPr/>
+        </p:nvSpPr>
+        <p:spPr>
+          <a:xfrm>
+            <a:off x="7436303" y="3915751"/>
+            <a:ext cx="1829188" cy="410549"/>
+          </a:xfrm>
+          <a:prstGeom prst="rect">
+            <a:avLst/>
+          </a:prstGeom>
+          <a:solidFill>
+            <a:schemeClr val="accent6">
+              <a:lumMod val="60000"/>
+              <a:lumOff val="40000"/>
+            </a:schemeClr>
+          </a:solidFill>
+          <a:ln w="28575">
+            <a:solidFill>
+              <a:schemeClr val="tx1"/>
+            </a:solidFill>
+          </a:ln>
+        </p:spPr>
+        <p:style>
+          <a:lnRef idx="2">
+            <a:schemeClr val="accent1">
+              <a:shade val="50000"/>
+            </a:schemeClr>
+          </a:lnRef>
+          <a:fillRef idx="1">
+            <a:schemeClr val="accent1"/>
+          </a:fillRef>
+          <a:effectRef idx="0">
+            <a:schemeClr val="accent1"/>
+          </a:effectRef>
+          <a:fontRef idx="minor">
+            <a:schemeClr val="lt1"/>
+          </a:fontRef>
+        </p:style>
+        <p:txBody>
+          <a:bodyPr rtlCol="0" anchor="t" anchorCtr="0"/>
+          <a:lstStyle/>
+          <a:p>
+            <a:pPr algn="ctr"/>
+            <a:r>
+              <a:rPr lang="en-US" dirty="0" err="1">
+                <a:solidFill>
+                  <a:schemeClr val="tx1"/>
+                </a:solidFill>
+              </a:rPr>
+              <a:t>TodoItem</a:t>
+            </a:r>
+            <a:endParaRPr lang="en-US" dirty="0">
+              <a:solidFill>
+                <a:schemeClr val="tx1"/>
+              </a:solidFill>
+            </a:endParaRPr>
+          </a:p>
+        </p:txBody>
+      </p:sp>
+      <p:sp>
+        <p:nvSpPr>
+          <p:cNvPr id="16" name="ลูกศร: ขวา 15"/>
+          <p:cNvSpPr/>
+          <p:nvPr/>
+        </p:nvSpPr>
+        <p:spPr>
+          <a:xfrm rot="3182500">
+            <a:off x="7528419" y="3331443"/>
+            <a:ext cx="981490" cy="248810"/>
+          </a:xfrm>
+          <a:prstGeom prst="rightArrow">
+            <a:avLst/>
+          </a:prstGeom>
+        </p:spPr>
+        <p:style>
+          <a:lnRef idx="2">
+            <a:schemeClr val="accent1">
+              <a:shade val="50000"/>
+            </a:schemeClr>
+          </a:lnRef>
+          <a:fillRef idx="1">
+            <a:schemeClr val="accent1"/>
+          </a:fillRef>
+          <a:effectRef idx="0">
+            <a:schemeClr val="accent1"/>
+          </a:effectRef>
+          <a:fontRef idx="minor">
+            <a:schemeClr val="lt1"/>
+          </a:fontRef>
+        </p:style>
+        <p:txBody>
+          <a:bodyPr rtlCol="0" anchor="ctr"/>
+          <a:lstStyle/>
+          <a:p>
+            <a:pPr algn="ctr"/>
+            <a:endParaRPr lang="en-US"/>
+          </a:p>
+        </p:txBody>
+      </p:sp>
+      <p:sp>
+        <p:nvSpPr>
+          <p:cNvPr id="18" name="ลูกศร: ขวา 17"/>
+          <p:cNvSpPr/>
+          <p:nvPr/>
+        </p:nvSpPr>
+        <p:spPr>
+          <a:xfrm rot="7118255">
+            <a:off x="5891580" y="3352935"/>
+            <a:ext cx="950125" cy="248810"/>
+          </a:xfrm>
+          <a:prstGeom prst="rightArrow">
+            <a:avLst/>
+          </a:prstGeom>
+        </p:spPr>
+        <p:style>
+          <a:lnRef idx="2">
+            <a:schemeClr val="accent1">
+              <a:shade val="50000"/>
+            </a:schemeClr>
+          </a:lnRef>
+          <a:fillRef idx="1">
+            <a:schemeClr val="accent1"/>
+          </a:fillRef>
+          <a:effectRef idx="0">
+            <a:schemeClr val="accent1"/>
+          </a:effectRef>
+          <a:fontRef idx="minor">
+            <a:schemeClr val="lt1"/>
+          </a:fontRef>
+        </p:style>
+        <p:txBody>
+          <a:bodyPr rtlCol="0" anchor="ctr"/>
+          <a:lstStyle/>
+          <a:p>
+            <a:pPr algn="ctr"/>
+            <a:endParaRPr lang="en-US"/>
+          </a:p>
+        </p:txBody>
+      </p:sp>
+      <p:sp>
+        <p:nvSpPr>
+          <p:cNvPr id="19" name="กล่องข้อความ 18"/>
+          <p:cNvSpPr txBox="1"/>
+          <p:nvPr/>
+        </p:nvSpPr>
+        <p:spPr>
+          <a:xfrm>
+            <a:off x="6608442" y="2988910"/>
+            <a:ext cx="1173290" cy="769441"/>
+          </a:xfrm>
+          <a:prstGeom prst="rect">
+            <a:avLst/>
+          </a:prstGeom>
+          <a:noFill/>
+        </p:spPr>
+        <p:txBody>
+          <a:bodyPr wrap="square" rtlCol="0">
+            <a:spAutoFit/>
+          </a:bodyPr>
+          <a:lstStyle/>
+          <a:p>
+            <a:r>
+              <a:rPr lang="en-US" sz="1100" dirty="0"/>
+              <a:t>{</a:t>
+            </a:r>
+          </a:p>
+          <a:p>
+            <a:r>
+              <a:rPr lang="en-US" sz="1100" dirty="0"/>
+              <a:t>  text: “walk”,</a:t>
+            </a:r>
+          </a:p>
+          <a:p>
+            <a:r>
+              <a:rPr lang="en-US" sz="1100" dirty="0"/>
+              <a:t>  status: “active”,</a:t>
+            </a:r>
+          </a:p>
+          <a:p>
+            <a:r>
+              <a:rPr lang="en-US" sz="1100" dirty="0"/>
+              <a:t>}</a:t>
+            </a:r>
+          </a:p>
+        </p:txBody>
+      </p:sp>
+      <p:sp>
+        <p:nvSpPr>
+          <p:cNvPr id="20" name="กล่องข้อความ 19"/>
+          <p:cNvSpPr txBox="1"/>
+          <p:nvPr/>
+        </p:nvSpPr>
+        <p:spPr>
+          <a:xfrm>
+            <a:off x="8350897" y="3000769"/>
+            <a:ext cx="1396585" cy="769441"/>
+          </a:xfrm>
+          <a:prstGeom prst="rect">
+            <a:avLst/>
+          </a:prstGeom>
+          <a:noFill/>
+        </p:spPr>
+        <p:txBody>
+          <a:bodyPr wrap="square" rtlCol="0">
+            <a:spAutoFit/>
+          </a:bodyPr>
+          <a:lstStyle/>
+          <a:p>
+            <a:r>
+              <a:rPr lang="en-US" sz="1100" dirty="0"/>
+              <a:t>{</a:t>
+            </a:r>
+          </a:p>
+          <a:p>
+            <a:r>
+              <a:rPr lang="en-US" sz="1100" dirty="0"/>
+              <a:t>  text: “run”,</a:t>
+            </a:r>
+          </a:p>
+          <a:p>
+            <a:r>
+              <a:rPr lang="en-US" sz="1100" dirty="0"/>
+              <a:t>  status: “complete”,</a:t>
+            </a:r>
+          </a:p>
+          <a:p>
+            <a:r>
+              <a:rPr lang="en-US" sz="1100" dirty="0"/>
+              <a:t>}</a:t>
+            </a:r>
+          </a:p>
+        </p:txBody>
+      </p:sp>
+      <p:sp>
+        <p:nvSpPr>
+          <p:cNvPr id="22" name="กล่องข้อความ 21"/>
+          <p:cNvSpPr txBox="1"/>
+          <p:nvPr/>
+        </p:nvSpPr>
+        <p:spPr>
+          <a:xfrm>
+            <a:off x="7781732" y="956607"/>
+            <a:ext cx="1418717" cy="1077218"/>
+          </a:xfrm>
+          <a:prstGeom prst="rect">
+            <a:avLst/>
+          </a:prstGeom>
+          <a:solidFill>
+            <a:schemeClr val="bg2">
+              <a:lumMod val="90000"/>
+            </a:schemeClr>
+          </a:solidFill>
+        </p:spPr>
+        <p:txBody>
+          <a:bodyPr wrap="square" rtlCol="0">
+            <a:spAutoFit/>
+          </a:bodyPr>
+          <a:lstStyle/>
+          <a:p>
+            <a:r>
+              <a:rPr lang="en-US" sz="1600" dirty="0" err="1"/>
+              <a:t>t</a:t>
+            </a:r>
+            <a:r>
+              <a:rPr lang="en-US" sz="1600" dirty="0" err="1" smtClean="0"/>
+              <a:t>his.state</a:t>
+            </a:r>
+            <a:r>
+              <a:rPr lang="en-US" sz="1600" dirty="0" smtClean="0"/>
+              <a:t> = </a:t>
+            </a:r>
+            <a:r>
+              <a:rPr lang="en-US" sz="1600" dirty="0" smtClean="0"/>
+              <a:t>{</a:t>
+            </a:r>
+            <a:endParaRPr lang="en-US" sz="1600" dirty="0"/>
+          </a:p>
+          <a:p>
+            <a:r>
+              <a:rPr lang="en-US" sz="1600" dirty="0"/>
+              <a:t>  </a:t>
+            </a:r>
+            <a:r>
+              <a:rPr lang="en-US" sz="1600" dirty="0" err="1"/>
+              <a:t>newTodo</a:t>
+            </a:r>
+            <a:r>
+              <a:rPr lang="en-US" sz="1600" dirty="0"/>
+              <a:t>: ‘’</a:t>
+            </a:r>
+          </a:p>
+          <a:p>
+            <a:r>
+              <a:rPr lang="en-US" sz="1600" dirty="0"/>
+              <a:t>  </a:t>
+            </a:r>
+            <a:r>
+              <a:rPr lang="en-US" sz="1600" dirty="0" err="1"/>
+              <a:t>todos</a:t>
+            </a:r>
+            <a:r>
+              <a:rPr lang="en-US" sz="1600" dirty="0"/>
+              <a:t>: […]</a:t>
+            </a:r>
+          </a:p>
+          <a:p>
+            <a:r>
+              <a:rPr lang="en-US" sz="1600" dirty="0"/>
+              <a:t>}</a:t>
+            </a:r>
+          </a:p>
+        </p:txBody>
+      </p:sp>
+      <p:cxnSp>
+        <p:nvCxnSpPr>
+          <p:cNvPr id="26" name="ตัวเชื่อมต่อตรง 25"/>
+          <p:cNvCxnSpPr>
+            <a:stCxn id="22" idx="1"/>
+            <a:endCxn id="6" idx="3"/>
+          </p:cNvCxnSpPr>
+          <p:nvPr/>
+        </p:nvCxnSpPr>
+        <p:spPr>
+          <a:xfrm flipH="1">
+            <a:off x="6734370" y="1495216"/>
+            <a:ext cx="1047362" cy="314928"/>
+          </a:xfrm>
+          <a:prstGeom prst="line">
+            <a:avLst/>
+          </a:prstGeom>
+          <a:ln w="28575">
+            <a:solidFill>
+              <a:schemeClr val="tx1"/>
+            </a:solidFill>
+          </a:ln>
+        </p:spPr>
+        <p:style>
+          <a:lnRef idx="1">
+            <a:schemeClr val="accent1"/>
+          </a:lnRef>
+          <a:fillRef idx="0">
+            <a:schemeClr val="accent1"/>
+          </a:fillRef>
+          <a:effectRef idx="0">
+            <a:schemeClr val="accent1"/>
+          </a:effectRef>
+          <a:fontRef idx="minor">
+            <a:schemeClr val="tx1"/>
+          </a:fontRef>
+        </p:style>
+      </p:cxnSp>
+      <p:sp>
+        <p:nvSpPr>
+          <p:cNvPr id="17" name="ลูกศร: ขวา 15"/>
+          <p:cNvSpPr/>
+          <p:nvPr/>
+        </p:nvSpPr>
+        <p:spPr>
+          <a:xfrm rot="3182500">
+            <a:off x="6161984" y="2158091"/>
+            <a:ext cx="536842" cy="267758"/>
+          </a:xfrm>
+          <a:prstGeom prst="rightArrow">
+            <a:avLst/>
+          </a:prstGeom>
+        </p:spPr>
+        <p:style>
+          <a:lnRef idx="2">
+            <a:schemeClr val="accent1">
+              <a:shade val="50000"/>
+            </a:schemeClr>
+          </a:lnRef>
+          <a:fillRef idx="1">
+            <a:schemeClr val="accent1"/>
+          </a:fillRef>
+          <a:effectRef idx="0">
+            <a:schemeClr val="accent1"/>
+          </a:effectRef>
+          <a:fontRef idx="minor">
+            <a:schemeClr val="lt1"/>
+          </a:fontRef>
+        </p:style>
+        <p:txBody>
+          <a:bodyPr rtlCol="0" anchor="ctr"/>
+          <a:lstStyle/>
+          <a:p>
+            <a:pPr algn="ctr"/>
+            <a:endParaRPr lang="en-US"/>
+          </a:p>
+        </p:txBody>
+      </p:sp>
+      <p:sp>
+        <p:nvSpPr>
+          <p:cNvPr id="21" name="กล่องข้อความ 19"/>
+          <p:cNvSpPr txBox="1"/>
+          <p:nvPr/>
+        </p:nvSpPr>
+        <p:spPr>
+          <a:xfrm>
+            <a:off x="6698768" y="2143478"/>
+            <a:ext cx="1396585" cy="338554"/>
+          </a:xfrm>
+          <a:prstGeom prst="rect">
+            <a:avLst/>
+          </a:prstGeom>
+          <a:noFill/>
+        </p:spPr>
+        <p:txBody>
+          <a:bodyPr wrap="square" rtlCol="0">
+            <a:spAutoFit/>
+          </a:bodyPr>
+          <a:lstStyle/>
+          <a:p>
+            <a:r>
+              <a:rPr lang="en-US" sz="1600" dirty="0" err="1" smtClean="0"/>
+              <a:t>todos</a:t>
+            </a:r>
+            <a:r>
+              <a:rPr lang="en-US" sz="1600" dirty="0" smtClean="0"/>
+              <a:t>: […]</a:t>
+            </a:r>
+            <a:endParaRPr lang="en-US" sz="1600" dirty="0"/>
+          </a:p>
+        </p:txBody>
+      </p:sp>
+      <p:sp>
+        <p:nvSpPr>
+          <p:cNvPr id="23" name="ลูกศร: ขวา 15"/>
+          <p:cNvSpPr/>
+          <p:nvPr/>
+        </p:nvSpPr>
+        <p:spPr>
+          <a:xfrm rot="7533164">
+            <a:off x="4458894" y="2158090"/>
+            <a:ext cx="536842" cy="267758"/>
+          </a:xfrm>
+          <a:prstGeom prst="rightArrow">
+            <a:avLst/>
+          </a:prstGeom>
+        </p:spPr>
+        <p:style>
+          <a:lnRef idx="2">
+            <a:schemeClr val="accent1">
+              <a:shade val="50000"/>
+            </a:schemeClr>
+          </a:lnRef>
+          <a:fillRef idx="1">
+            <a:schemeClr val="accent1"/>
+          </a:fillRef>
+          <a:effectRef idx="0">
+            <a:schemeClr val="accent1"/>
+          </a:effectRef>
+          <a:fontRef idx="minor">
+            <a:schemeClr val="lt1"/>
+          </a:fontRef>
+        </p:style>
+        <p:txBody>
+          <a:bodyPr rtlCol="0" anchor="ctr"/>
+          <a:lstStyle/>
+          <a:p>
+            <a:pPr algn="ctr"/>
+            <a:endParaRPr lang="en-US"/>
+          </a:p>
+        </p:txBody>
+      </p:sp>
+      <p:sp>
+        <p:nvSpPr>
+          <p:cNvPr id="24" name="กล่องข้อความ 19"/>
+          <p:cNvSpPr txBox="1"/>
+          <p:nvPr/>
+        </p:nvSpPr>
+        <p:spPr>
+          <a:xfrm>
+            <a:off x="3330730" y="2125071"/>
+            <a:ext cx="1396585" cy="338554"/>
+          </a:xfrm>
+          <a:prstGeom prst="rect">
+            <a:avLst/>
+          </a:prstGeom>
+          <a:noFill/>
+        </p:spPr>
+        <p:txBody>
+          <a:bodyPr wrap="square" rtlCol="0">
+            <a:spAutoFit/>
+          </a:bodyPr>
+          <a:lstStyle/>
+          <a:p>
+            <a:r>
+              <a:rPr lang="en-US" sz="1600" dirty="0" err="1" smtClean="0"/>
+              <a:t>newTodo</a:t>
+            </a:r>
+            <a:r>
+              <a:rPr lang="en-US" sz="1600" dirty="0" smtClean="0"/>
+              <a:t>: ‘’</a:t>
+            </a:r>
+            <a:endParaRPr lang="en-US" sz="1600" dirty="0"/>
+          </a:p>
+        </p:txBody>
+      </p:sp>
+      <p:sp>
+        <p:nvSpPr>
+          <p:cNvPr id="2" name="Bent Arrow 1"/>
+          <p:cNvSpPr/>
+          <p:nvPr/>
+        </p:nvSpPr>
+        <p:spPr>
+          <a:xfrm>
+            <a:off x="3036061" y="1651526"/>
+            <a:ext cx="1080458" cy="926837"/>
+          </a:xfrm>
+          <a:prstGeom prst="bentArrow">
+            <a:avLst>
+              <a:gd name="adj1" fmla="val 18421"/>
+              <a:gd name="adj2" fmla="val 17720"/>
+              <a:gd name="adj3" fmla="val 25000"/>
+              <a:gd name="adj4" fmla="val 33083"/>
+            </a:avLst>
+          </a:prstGeom>
+        </p:spPr>
+        <p:style>
+          <a:lnRef idx="2">
+            <a:schemeClr val="accent3">
+              <a:shade val="50000"/>
+            </a:schemeClr>
+          </a:lnRef>
+          <a:fillRef idx="1">
+            <a:schemeClr val="accent3"/>
+          </a:fillRef>
+          <a:effectRef idx="0">
+            <a:schemeClr val="accent3"/>
+          </a:effectRef>
+          <a:fontRef idx="minor">
+            <a:schemeClr val="lt1"/>
+          </a:fontRef>
+        </p:style>
+        <p:txBody>
+          <a:bodyPr rtlCol="0" anchor="ctr"/>
+          <a:lstStyle/>
+          <a:p>
+            <a:pPr algn="ctr"/>
+            <a:endParaRPr lang="en-US">
+              <a:solidFill>
+                <a:schemeClr val="tx1"/>
+              </a:solidFill>
+            </a:endParaRPr>
+          </a:p>
+        </p:txBody>
+      </p:sp>
+      <p:sp>
+        <p:nvSpPr>
+          <p:cNvPr id="25" name="กล่องข้อความ 19"/>
+          <p:cNvSpPr txBox="1"/>
+          <p:nvPr/>
+        </p:nvSpPr>
+        <p:spPr>
+          <a:xfrm>
+            <a:off x="2028119" y="1108443"/>
+            <a:ext cx="1526695" cy="523220"/>
+          </a:xfrm>
+          <a:prstGeom prst="rect">
+            <a:avLst/>
+          </a:prstGeom>
+          <a:noFill/>
+        </p:spPr>
+        <p:txBody>
+          <a:bodyPr wrap="square" rtlCol="0">
+            <a:spAutoFit/>
+          </a:bodyPr>
+          <a:lstStyle/>
+          <a:p>
+            <a:r>
+              <a:rPr lang="en-US" sz="1400" dirty="0" err="1" smtClean="0"/>
+              <a:t>addTodo</a:t>
+            </a:r>
+            <a:r>
+              <a:rPr lang="en-US" sz="1400" dirty="0" smtClean="0"/>
+              <a:t>(),</a:t>
+            </a:r>
+            <a:br>
+              <a:rPr lang="en-US" sz="1400" dirty="0" smtClean="0"/>
+            </a:br>
+            <a:r>
+              <a:rPr lang="en-US" sz="1400" dirty="0" err="1" smtClean="0"/>
+              <a:t>updateNewTodo</a:t>
+            </a:r>
+            <a:r>
+              <a:rPr lang="en-US" sz="1400" dirty="0" smtClean="0"/>
+              <a:t>()</a:t>
+            </a:r>
+            <a:endParaRPr lang="en-US" sz="1400" dirty="0"/>
+          </a:p>
+        </p:txBody>
+      </p:sp>
+    </p:spTree>
+    <p:extLst>
+      <p:ext uri="{BB962C8B-B14F-4D97-AF65-F5344CB8AC3E}">
+        <p14:creationId xmlns:p14="http://schemas.microsoft.com/office/powerpoint/2010/main" val="3477657385"/>
+      </p:ext>
+    </p:extLst>
+  </p:cSld>
+  <p:clrMapOvr>
+    <a:masterClrMapping/>
+  </p:clrMapOvr>
+  <p:timing>
+    <p:tnLst>
+      <p:par>
+        <p:cTn id="1" dur="indefinite" restart="never" nodeType="tmRoot"/>
+      </p:par>
+    </p:tnLst>
+  </p:timing>
+</p:sld>
+</file>
+
+<file path=ppt/slides/slide6.xml><?xml version="1.0" encoding="utf-8"?>
+<p:sld xmlns:a="http://schemas.openxmlformats.org/drawingml/2006/main" xmlns:r="http://schemas.openxmlformats.org/officeDocument/2006/relationships" xmlns:p="http://schemas.openxmlformats.org/presentationml/2006/main">
+  <p:cSld>
+    <p:spTree>
+      <p:nvGrpSpPr>
+        <p:cNvPr id="1" name=""/>
+        <p:cNvGrpSpPr/>
+        <p:nvPr/>
+      </p:nvGrpSpPr>
+      <p:grpSpPr>
+        <a:xfrm>
+          <a:off x="0" y="0"/>
+          <a:ext cx="0" cy="0"/>
+          <a:chOff x="0" y="0"/>
+          <a:chExt cx="0" cy="0"/>
+        </a:xfrm>
+      </p:grpSpPr>
+      <p:sp>
+        <p:nvSpPr>
+          <p:cNvPr id="28" name="Rectangle 27"/>
+          <p:cNvSpPr/>
+          <p:nvPr/>
+        </p:nvSpPr>
+        <p:spPr>
+          <a:xfrm>
+            <a:off x="1901952" y="694944"/>
+            <a:ext cx="8058912" cy="4059936"/>
+          </a:xfrm>
+          <a:prstGeom prst="rect">
+            <a:avLst/>
+          </a:prstGeom>
+          <a:ln w="28575"/>
+        </p:spPr>
+        <p:style>
+          <a:lnRef idx="2">
+            <a:schemeClr val="accent6"/>
+          </a:lnRef>
+          <a:fillRef idx="1">
+            <a:schemeClr val="lt1"/>
+          </a:fillRef>
+          <a:effectRef idx="0">
+            <a:schemeClr val="accent6"/>
+          </a:effectRef>
+          <a:fontRef idx="minor">
+            <a:schemeClr val="dk1"/>
+          </a:fontRef>
+        </p:style>
+        <p:txBody>
+          <a:bodyPr rtlCol="0" anchor="ctr"/>
+          <a:lstStyle/>
+          <a:p>
+            <a:pPr algn="ctr"/>
+            <a:endParaRPr lang="en-US"/>
+          </a:p>
+        </p:txBody>
+      </p:sp>
+      <p:sp>
+        <p:nvSpPr>
+          <p:cNvPr id="6" name="สี่เหลี่ยมผืนผ้า 5"/>
+          <p:cNvSpPr/>
+          <p:nvPr/>
+        </p:nvSpPr>
+        <p:spPr>
+          <a:xfrm>
+            <a:off x="4152121" y="1604869"/>
+            <a:ext cx="2582249" cy="410549"/>
+          </a:xfrm>
+          <a:prstGeom prst="rect">
+            <a:avLst/>
+          </a:prstGeom>
+          <a:solidFill>
+            <a:schemeClr val="accent1"/>
+          </a:solidFill>
+          <a:ln w="28575">
+            <a:solidFill>
+              <a:schemeClr val="tx1"/>
+            </a:solidFill>
+          </a:ln>
+        </p:spPr>
+        <p:style>
+          <a:lnRef idx="2">
+            <a:schemeClr val="accent1">
+              <a:shade val="50000"/>
+            </a:schemeClr>
+          </a:lnRef>
+          <a:fillRef idx="1">
+            <a:schemeClr val="accent1"/>
+          </a:fillRef>
+          <a:effectRef idx="0">
+            <a:schemeClr val="accent1"/>
+          </a:effectRef>
+          <a:fontRef idx="minor">
+            <a:schemeClr val="lt1"/>
+          </a:fontRef>
+        </p:style>
+        <p:txBody>
+          <a:bodyPr rtlCol="0" anchor="t" anchorCtr="0"/>
+          <a:lstStyle/>
+          <a:p>
+            <a:pPr algn="ctr"/>
+            <a:r>
+              <a:rPr lang="en-US" dirty="0" err="1">
+                <a:solidFill>
+                  <a:schemeClr val="tx1"/>
+                </a:solidFill>
+              </a:rPr>
+              <a:t>TodoApp</a:t>
+            </a:r>
+            <a:endParaRPr lang="en-US" dirty="0">
+              <a:solidFill>
+                <a:schemeClr val="tx1"/>
+              </a:solidFill>
+            </a:endParaRPr>
+          </a:p>
+        </p:txBody>
+      </p:sp>
+      <p:sp>
+        <p:nvSpPr>
+          <p:cNvPr id="11" name="สี่เหลี่ยมผืนผ้า 10"/>
+          <p:cNvSpPr/>
+          <p:nvPr/>
+        </p:nvSpPr>
+        <p:spPr>
+          <a:xfrm>
+            <a:off x="2606350" y="2578364"/>
+            <a:ext cx="2582249" cy="410549"/>
+          </a:xfrm>
+          <a:prstGeom prst="rect">
+            <a:avLst/>
+          </a:prstGeom>
+          <a:solidFill>
+            <a:schemeClr val="accent4"/>
+          </a:solidFill>
+          <a:ln w="28575">
+            <a:solidFill>
+              <a:schemeClr val="tx1"/>
+            </a:solidFill>
+          </a:ln>
+        </p:spPr>
+        <p:style>
+          <a:lnRef idx="2">
+            <a:schemeClr val="accent1">
+              <a:shade val="50000"/>
+            </a:schemeClr>
+          </a:lnRef>
+          <a:fillRef idx="1">
+            <a:schemeClr val="accent1"/>
+          </a:fillRef>
+          <a:effectRef idx="0">
+            <a:schemeClr val="accent1"/>
+          </a:effectRef>
+          <a:fontRef idx="minor">
+            <a:schemeClr val="lt1"/>
+          </a:fontRef>
+        </p:style>
+        <p:txBody>
+          <a:bodyPr rtlCol="0" anchor="t" anchorCtr="0"/>
+          <a:lstStyle/>
+          <a:p>
+            <a:pPr algn="ctr"/>
+            <a:r>
+              <a:rPr lang="en-US" dirty="0" err="1">
+                <a:solidFill>
+                  <a:schemeClr val="tx1"/>
+                </a:solidFill>
+              </a:rPr>
+              <a:t>TodoInput</a:t>
+            </a:r>
+            <a:endParaRPr lang="en-US" dirty="0">
+              <a:solidFill>
+                <a:schemeClr val="tx1"/>
+              </a:solidFill>
+            </a:endParaRPr>
+          </a:p>
+        </p:txBody>
+      </p:sp>
+      <p:sp>
+        <p:nvSpPr>
+          <p:cNvPr id="13" name="สี่เหลี่ยมผืนผ้า 12"/>
+          <p:cNvSpPr/>
+          <p:nvPr/>
+        </p:nvSpPr>
+        <p:spPr>
+          <a:xfrm>
+            <a:off x="5641909" y="2578363"/>
+            <a:ext cx="2582249" cy="410549"/>
+          </a:xfrm>
+          <a:prstGeom prst="rect">
+            <a:avLst/>
+          </a:prstGeom>
+          <a:solidFill>
+            <a:schemeClr val="accent4"/>
+          </a:solidFill>
+          <a:ln w="28575">
+            <a:solidFill>
+              <a:schemeClr val="tx1"/>
+            </a:solidFill>
+          </a:ln>
+        </p:spPr>
+        <p:style>
+          <a:lnRef idx="2">
+            <a:schemeClr val="accent1">
+              <a:shade val="50000"/>
+            </a:schemeClr>
+          </a:lnRef>
+          <a:fillRef idx="1">
+            <a:schemeClr val="accent1"/>
+          </a:fillRef>
+          <a:effectRef idx="0">
+            <a:schemeClr val="accent1"/>
+          </a:effectRef>
+          <a:fontRef idx="minor">
+            <a:schemeClr val="lt1"/>
+          </a:fontRef>
+        </p:style>
+        <p:txBody>
+          <a:bodyPr rtlCol="0" anchor="t" anchorCtr="0"/>
+          <a:lstStyle/>
+          <a:p>
+            <a:pPr algn="ctr"/>
+            <a:r>
+              <a:rPr lang="en-US" dirty="0" err="1">
+                <a:solidFill>
+                  <a:schemeClr val="tx1"/>
+                </a:solidFill>
+              </a:rPr>
+              <a:t>TodoList</a:t>
+            </a:r>
+            <a:endParaRPr lang="en-US" dirty="0">
+              <a:solidFill>
+                <a:schemeClr val="tx1"/>
+              </a:solidFill>
+            </a:endParaRPr>
+          </a:p>
+        </p:txBody>
+      </p:sp>
+      <p:sp>
+        <p:nvSpPr>
+          <p:cNvPr id="14" name="สี่เหลี่ยมผืนผ้า 13"/>
+          <p:cNvSpPr/>
+          <p:nvPr/>
+        </p:nvSpPr>
+        <p:spPr>
+          <a:xfrm>
+            <a:off x="4727315" y="3915751"/>
+            <a:ext cx="1829188" cy="410549"/>
+          </a:xfrm>
+          <a:prstGeom prst="rect">
+            <a:avLst/>
+          </a:prstGeom>
+          <a:solidFill>
+            <a:schemeClr val="accent6">
+              <a:lumMod val="60000"/>
+              <a:lumOff val="40000"/>
+            </a:schemeClr>
+          </a:solidFill>
+          <a:ln w="28575">
+            <a:solidFill>
+              <a:schemeClr val="tx1"/>
+            </a:solidFill>
+          </a:ln>
+        </p:spPr>
+        <p:style>
+          <a:lnRef idx="2">
+            <a:schemeClr val="accent1">
+              <a:shade val="50000"/>
+            </a:schemeClr>
+          </a:lnRef>
+          <a:fillRef idx="1">
+            <a:schemeClr val="accent1"/>
+          </a:fillRef>
+          <a:effectRef idx="0">
+            <a:schemeClr val="accent1"/>
+          </a:effectRef>
+          <a:fontRef idx="minor">
+            <a:schemeClr val="lt1"/>
+          </a:fontRef>
+        </p:style>
+        <p:txBody>
+          <a:bodyPr rtlCol="0" anchor="t" anchorCtr="0"/>
+          <a:lstStyle/>
+          <a:p>
+            <a:pPr algn="ctr"/>
+            <a:r>
+              <a:rPr lang="en-US" dirty="0" err="1">
+                <a:solidFill>
+                  <a:schemeClr val="tx1"/>
+                </a:solidFill>
+              </a:rPr>
+              <a:t>TodoItem</a:t>
+            </a:r>
+            <a:endParaRPr lang="en-US" dirty="0">
+              <a:solidFill>
+                <a:schemeClr val="tx1"/>
+              </a:solidFill>
+            </a:endParaRPr>
+          </a:p>
+        </p:txBody>
+      </p:sp>
+      <p:sp>
+        <p:nvSpPr>
+          <p:cNvPr id="15" name="สี่เหลี่ยมผืนผ้า 14"/>
+          <p:cNvSpPr/>
+          <p:nvPr/>
+        </p:nvSpPr>
+        <p:spPr>
+          <a:xfrm>
+            <a:off x="7436303" y="3915751"/>
+            <a:ext cx="1829188" cy="410549"/>
+          </a:xfrm>
+          <a:prstGeom prst="rect">
+            <a:avLst/>
+          </a:prstGeom>
+          <a:solidFill>
+            <a:schemeClr val="accent6">
+              <a:lumMod val="60000"/>
+              <a:lumOff val="40000"/>
+            </a:schemeClr>
+          </a:solidFill>
+          <a:ln w="28575">
+            <a:solidFill>
+              <a:schemeClr val="tx1"/>
+            </a:solidFill>
+          </a:ln>
+        </p:spPr>
+        <p:style>
+          <a:lnRef idx="2">
+            <a:schemeClr val="accent1">
+              <a:shade val="50000"/>
+            </a:schemeClr>
+          </a:lnRef>
+          <a:fillRef idx="1">
+            <a:schemeClr val="accent1"/>
+          </a:fillRef>
+          <a:effectRef idx="0">
+            <a:schemeClr val="accent1"/>
+          </a:effectRef>
+          <a:fontRef idx="minor">
+            <a:schemeClr val="lt1"/>
+          </a:fontRef>
+        </p:style>
+        <p:txBody>
+          <a:bodyPr rtlCol="0" anchor="t" anchorCtr="0"/>
+          <a:lstStyle/>
+          <a:p>
+            <a:pPr algn="ctr"/>
+            <a:r>
+              <a:rPr lang="en-US" dirty="0" err="1">
+                <a:solidFill>
+                  <a:schemeClr val="tx1"/>
+                </a:solidFill>
+              </a:rPr>
+              <a:t>TodoItem</a:t>
+            </a:r>
+            <a:endParaRPr lang="en-US" dirty="0">
+              <a:solidFill>
+                <a:schemeClr val="tx1"/>
+              </a:solidFill>
+            </a:endParaRPr>
+          </a:p>
+        </p:txBody>
+      </p:sp>
+      <p:sp>
+        <p:nvSpPr>
+          <p:cNvPr id="16" name="ลูกศร: ขวา 15"/>
+          <p:cNvSpPr/>
+          <p:nvPr/>
+        </p:nvSpPr>
+        <p:spPr>
+          <a:xfrm rot="3182500">
+            <a:off x="7528419" y="3331443"/>
+            <a:ext cx="981490" cy="248810"/>
+          </a:xfrm>
+          <a:prstGeom prst="rightArrow">
+            <a:avLst/>
+          </a:prstGeom>
+        </p:spPr>
+        <p:style>
+          <a:lnRef idx="2">
+            <a:schemeClr val="accent1">
+              <a:shade val="50000"/>
+            </a:schemeClr>
+          </a:lnRef>
+          <a:fillRef idx="1">
+            <a:schemeClr val="accent1"/>
+          </a:fillRef>
+          <a:effectRef idx="0">
+            <a:schemeClr val="accent1"/>
+          </a:effectRef>
+          <a:fontRef idx="minor">
+            <a:schemeClr val="lt1"/>
+          </a:fontRef>
+        </p:style>
+        <p:txBody>
+          <a:bodyPr rtlCol="0" anchor="ctr"/>
+          <a:lstStyle/>
+          <a:p>
+            <a:pPr algn="ctr"/>
+            <a:endParaRPr lang="en-US"/>
+          </a:p>
+        </p:txBody>
+      </p:sp>
+      <p:sp>
+        <p:nvSpPr>
+          <p:cNvPr id="18" name="ลูกศร: ขวา 17"/>
+          <p:cNvSpPr/>
+          <p:nvPr/>
+        </p:nvSpPr>
+        <p:spPr>
+          <a:xfrm rot="7118255">
+            <a:off x="5891580" y="3352935"/>
+            <a:ext cx="950125" cy="248810"/>
+          </a:xfrm>
+          <a:prstGeom prst="rightArrow">
+            <a:avLst/>
+          </a:prstGeom>
+        </p:spPr>
+        <p:style>
+          <a:lnRef idx="2">
+            <a:schemeClr val="accent1">
+              <a:shade val="50000"/>
+            </a:schemeClr>
+          </a:lnRef>
+          <a:fillRef idx="1">
+            <a:schemeClr val="accent1"/>
+          </a:fillRef>
+          <a:effectRef idx="0">
+            <a:schemeClr val="accent1"/>
+          </a:effectRef>
+          <a:fontRef idx="minor">
+            <a:schemeClr val="lt1"/>
+          </a:fontRef>
+        </p:style>
+        <p:txBody>
+          <a:bodyPr rtlCol="0" anchor="ctr"/>
+          <a:lstStyle/>
+          <a:p>
+            <a:pPr algn="ctr"/>
+            <a:endParaRPr lang="en-US"/>
+          </a:p>
+        </p:txBody>
+      </p:sp>
+      <p:sp>
+        <p:nvSpPr>
+          <p:cNvPr id="19" name="กล่องข้อความ 18"/>
+          <p:cNvSpPr txBox="1"/>
+          <p:nvPr/>
+        </p:nvSpPr>
+        <p:spPr>
+          <a:xfrm>
+            <a:off x="6608442" y="2988910"/>
+            <a:ext cx="1173290" cy="769441"/>
+          </a:xfrm>
+          <a:prstGeom prst="rect">
+            <a:avLst/>
+          </a:prstGeom>
+          <a:noFill/>
+        </p:spPr>
+        <p:txBody>
+          <a:bodyPr wrap="square" rtlCol="0">
+            <a:spAutoFit/>
+          </a:bodyPr>
+          <a:lstStyle/>
+          <a:p>
+            <a:r>
+              <a:rPr lang="en-US" sz="1100" dirty="0"/>
+              <a:t>{</a:t>
+            </a:r>
+          </a:p>
+          <a:p>
+            <a:r>
+              <a:rPr lang="en-US" sz="1100" dirty="0"/>
+              <a:t>  text: “walk”,</a:t>
+            </a:r>
+          </a:p>
+          <a:p>
+            <a:r>
+              <a:rPr lang="en-US" sz="1100" dirty="0"/>
+              <a:t>  status: “active”,</a:t>
+            </a:r>
+          </a:p>
+          <a:p>
+            <a:r>
+              <a:rPr lang="en-US" sz="1100" dirty="0"/>
+              <a:t>}</a:t>
+            </a:r>
+          </a:p>
+        </p:txBody>
+      </p:sp>
+      <p:sp>
+        <p:nvSpPr>
+          <p:cNvPr id="20" name="กล่องข้อความ 19"/>
+          <p:cNvSpPr txBox="1"/>
+          <p:nvPr/>
+        </p:nvSpPr>
+        <p:spPr>
+          <a:xfrm>
+            <a:off x="8350897" y="3000769"/>
+            <a:ext cx="1396585" cy="769441"/>
+          </a:xfrm>
+          <a:prstGeom prst="rect">
+            <a:avLst/>
+          </a:prstGeom>
+          <a:noFill/>
+        </p:spPr>
+        <p:txBody>
+          <a:bodyPr wrap="square" rtlCol="0">
+            <a:spAutoFit/>
+          </a:bodyPr>
+          <a:lstStyle/>
+          <a:p>
+            <a:r>
+              <a:rPr lang="en-US" sz="1100" dirty="0"/>
+              <a:t>{</a:t>
+            </a:r>
+          </a:p>
+          <a:p>
+            <a:r>
+              <a:rPr lang="en-US" sz="1100" dirty="0"/>
+              <a:t>  text: “run”,</a:t>
+            </a:r>
+          </a:p>
+          <a:p>
+            <a:r>
+              <a:rPr lang="en-US" sz="1100" dirty="0"/>
+              <a:t>  status: “complete”,</a:t>
+            </a:r>
+          </a:p>
+          <a:p>
+            <a:r>
+              <a:rPr lang="en-US" sz="1100" dirty="0"/>
+              <a:t>}</a:t>
+            </a:r>
+          </a:p>
+        </p:txBody>
+      </p:sp>
+      <p:sp>
+        <p:nvSpPr>
+          <p:cNvPr id="22" name="กล่องข้อความ 21"/>
+          <p:cNvSpPr txBox="1"/>
+          <p:nvPr/>
+        </p:nvSpPr>
+        <p:spPr>
+          <a:xfrm>
+            <a:off x="7781732" y="956607"/>
+            <a:ext cx="1418717" cy="1077218"/>
+          </a:xfrm>
+          <a:prstGeom prst="rect">
+            <a:avLst/>
+          </a:prstGeom>
+          <a:solidFill>
+            <a:schemeClr val="bg2">
+              <a:lumMod val="90000"/>
+            </a:schemeClr>
+          </a:solidFill>
+        </p:spPr>
+        <p:txBody>
+          <a:bodyPr wrap="square" rtlCol="0">
+            <a:spAutoFit/>
+          </a:bodyPr>
+          <a:lstStyle/>
+          <a:p>
+            <a:r>
+              <a:rPr lang="en-US" sz="1600" dirty="0" err="1"/>
+              <a:t>t</a:t>
+            </a:r>
+            <a:r>
+              <a:rPr lang="en-US" sz="1600" dirty="0" err="1" smtClean="0"/>
+              <a:t>his.state</a:t>
+            </a:r>
+            <a:r>
+              <a:rPr lang="en-US" sz="1600" dirty="0" smtClean="0"/>
+              <a:t> = </a:t>
+            </a:r>
+            <a:r>
+              <a:rPr lang="en-US" sz="1600" dirty="0" smtClean="0"/>
+              <a:t>{</a:t>
+            </a:r>
+            <a:endParaRPr lang="en-US" sz="1600" dirty="0"/>
+          </a:p>
+          <a:p>
+            <a:r>
+              <a:rPr lang="en-US" sz="1600" dirty="0"/>
+              <a:t>  </a:t>
+            </a:r>
+            <a:r>
+              <a:rPr lang="en-US" sz="1600" dirty="0" err="1"/>
+              <a:t>newTodo</a:t>
+            </a:r>
+            <a:r>
+              <a:rPr lang="en-US" sz="1600" dirty="0"/>
+              <a:t>: ‘’</a:t>
+            </a:r>
+          </a:p>
+          <a:p>
+            <a:r>
+              <a:rPr lang="en-US" sz="1600" dirty="0"/>
+              <a:t>  </a:t>
+            </a:r>
+            <a:r>
+              <a:rPr lang="en-US" sz="1600" dirty="0" err="1"/>
+              <a:t>todos</a:t>
+            </a:r>
+            <a:r>
+              <a:rPr lang="en-US" sz="1600" dirty="0"/>
+              <a:t>: […]</a:t>
+            </a:r>
+          </a:p>
+          <a:p>
+            <a:r>
+              <a:rPr lang="en-US" sz="1600" dirty="0"/>
+              <a:t>}</a:t>
+            </a:r>
+          </a:p>
+        </p:txBody>
+      </p:sp>
+      <p:cxnSp>
+        <p:nvCxnSpPr>
+          <p:cNvPr id="26" name="ตัวเชื่อมต่อตรง 25"/>
+          <p:cNvCxnSpPr>
+            <a:stCxn id="22" idx="1"/>
+            <a:endCxn id="6" idx="3"/>
+          </p:cNvCxnSpPr>
+          <p:nvPr/>
+        </p:nvCxnSpPr>
+        <p:spPr>
+          <a:xfrm flipH="1">
+            <a:off x="6734370" y="1495216"/>
+            <a:ext cx="1047362" cy="314928"/>
+          </a:xfrm>
+          <a:prstGeom prst="line">
+            <a:avLst/>
+          </a:prstGeom>
+          <a:ln w="28575">
+            <a:solidFill>
+              <a:schemeClr val="tx1"/>
+            </a:solidFill>
+          </a:ln>
+        </p:spPr>
+        <p:style>
+          <a:lnRef idx="1">
+            <a:schemeClr val="accent1"/>
+          </a:lnRef>
+          <a:fillRef idx="0">
+            <a:schemeClr val="accent1"/>
+          </a:fillRef>
+          <a:effectRef idx="0">
+            <a:schemeClr val="accent1"/>
+          </a:effectRef>
+          <a:fontRef idx="minor">
+            <a:schemeClr val="tx1"/>
+          </a:fontRef>
+        </p:style>
+      </p:cxnSp>
+      <p:sp>
+        <p:nvSpPr>
+          <p:cNvPr id="17" name="ลูกศร: ขวา 15"/>
+          <p:cNvSpPr/>
+          <p:nvPr/>
+        </p:nvSpPr>
+        <p:spPr>
+          <a:xfrm rot="3182500">
+            <a:off x="6161984" y="2158091"/>
+            <a:ext cx="536842" cy="267758"/>
+          </a:xfrm>
+          <a:prstGeom prst="rightArrow">
+            <a:avLst/>
+          </a:prstGeom>
+        </p:spPr>
+        <p:style>
+          <a:lnRef idx="2">
+            <a:schemeClr val="accent1">
+              <a:shade val="50000"/>
+            </a:schemeClr>
+          </a:lnRef>
+          <a:fillRef idx="1">
+            <a:schemeClr val="accent1"/>
+          </a:fillRef>
+          <a:effectRef idx="0">
+            <a:schemeClr val="accent1"/>
+          </a:effectRef>
+          <a:fontRef idx="minor">
+            <a:schemeClr val="lt1"/>
+          </a:fontRef>
+        </p:style>
+        <p:txBody>
+          <a:bodyPr rtlCol="0" anchor="ctr"/>
+          <a:lstStyle/>
+          <a:p>
+            <a:pPr algn="ctr"/>
+            <a:endParaRPr lang="en-US"/>
+          </a:p>
+        </p:txBody>
+      </p:sp>
+      <p:sp>
+        <p:nvSpPr>
+          <p:cNvPr id="21" name="กล่องข้อความ 19"/>
+          <p:cNvSpPr txBox="1"/>
+          <p:nvPr/>
+        </p:nvSpPr>
+        <p:spPr>
+          <a:xfrm>
+            <a:off x="6698768" y="2143478"/>
+            <a:ext cx="1396585" cy="338554"/>
+          </a:xfrm>
+          <a:prstGeom prst="rect">
+            <a:avLst/>
+          </a:prstGeom>
+          <a:noFill/>
+        </p:spPr>
+        <p:txBody>
+          <a:bodyPr wrap="square" rtlCol="0">
+            <a:spAutoFit/>
+          </a:bodyPr>
+          <a:lstStyle/>
+          <a:p>
+            <a:r>
+              <a:rPr lang="en-US" sz="1600" dirty="0" err="1" smtClean="0"/>
+              <a:t>todos</a:t>
+            </a:r>
+            <a:r>
+              <a:rPr lang="en-US" sz="1600" dirty="0" smtClean="0"/>
+              <a:t>: […]</a:t>
+            </a:r>
+            <a:endParaRPr lang="en-US" sz="1600" dirty="0"/>
+          </a:p>
+        </p:txBody>
+      </p:sp>
+      <p:sp>
+        <p:nvSpPr>
+          <p:cNvPr id="23" name="ลูกศร: ขวา 15"/>
+          <p:cNvSpPr/>
+          <p:nvPr/>
+        </p:nvSpPr>
+        <p:spPr>
+          <a:xfrm rot="7533164">
+            <a:off x="4458894" y="2158090"/>
+            <a:ext cx="536842" cy="267758"/>
+          </a:xfrm>
+          <a:prstGeom prst="rightArrow">
+            <a:avLst/>
+          </a:prstGeom>
+        </p:spPr>
+        <p:style>
+          <a:lnRef idx="2">
+            <a:schemeClr val="accent1">
+              <a:shade val="50000"/>
+            </a:schemeClr>
+          </a:lnRef>
+          <a:fillRef idx="1">
+            <a:schemeClr val="accent1"/>
+          </a:fillRef>
+          <a:effectRef idx="0">
+            <a:schemeClr val="accent1"/>
+          </a:effectRef>
+          <a:fontRef idx="minor">
+            <a:schemeClr val="lt1"/>
+          </a:fontRef>
+        </p:style>
+        <p:txBody>
+          <a:bodyPr rtlCol="0" anchor="ctr"/>
+          <a:lstStyle/>
+          <a:p>
+            <a:pPr algn="ctr"/>
+            <a:endParaRPr lang="en-US"/>
+          </a:p>
+        </p:txBody>
+      </p:sp>
+      <p:sp>
+        <p:nvSpPr>
+          <p:cNvPr id="24" name="กล่องข้อความ 19"/>
+          <p:cNvSpPr txBox="1"/>
+          <p:nvPr/>
+        </p:nvSpPr>
+        <p:spPr>
+          <a:xfrm>
+            <a:off x="3330730" y="2125071"/>
+            <a:ext cx="1396585" cy="338554"/>
+          </a:xfrm>
+          <a:prstGeom prst="rect">
+            <a:avLst/>
+          </a:prstGeom>
+          <a:noFill/>
+        </p:spPr>
+        <p:txBody>
+          <a:bodyPr wrap="square" rtlCol="0">
+            <a:spAutoFit/>
+          </a:bodyPr>
+          <a:lstStyle/>
+          <a:p>
+            <a:r>
+              <a:rPr lang="en-US" sz="1600" dirty="0" err="1" smtClean="0"/>
+              <a:t>newTodo</a:t>
+            </a:r>
+            <a:r>
+              <a:rPr lang="en-US" sz="1600" dirty="0" smtClean="0"/>
+              <a:t>: ‘’</a:t>
+            </a:r>
+            <a:endParaRPr lang="en-US" sz="1600" dirty="0"/>
+          </a:p>
+        </p:txBody>
+      </p:sp>
+      <p:sp>
+        <p:nvSpPr>
+          <p:cNvPr id="2" name="Bent Arrow 1"/>
+          <p:cNvSpPr/>
+          <p:nvPr/>
+        </p:nvSpPr>
+        <p:spPr>
+          <a:xfrm>
+            <a:off x="3036061" y="1651526"/>
+            <a:ext cx="1080458" cy="926837"/>
+          </a:xfrm>
+          <a:prstGeom prst="bentArrow">
+            <a:avLst>
+              <a:gd name="adj1" fmla="val 18421"/>
+              <a:gd name="adj2" fmla="val 17720"/>
+              <a:gd name="adj3" fmla="val 25000"/>
+              <a:gd name="adj4" fmla="val 33083"/>
+            </a:avLst>
+          </a:prstGeom>
+        </p:spPr>
+        <p:style>
+          <a:lnRef idx="2">
+            <a:schemeClr val="accent3">
+              <a:shade val="50000"/>
+            </a:schemeClr>
+          </a:lnRef>
+          <a:fillRef idx="1">
+            <a:schemeClr val="accent3"/>
+          </a:fillRef>
+          <a:effectRef idx="0">
+            <a:schemeClr val="accent3"/>
+          </a:effectRef>
+          <a:fontRef idx="minor">
+            <a:schemeClr val="lt1"/>
+          </a:fontRef>
+        </p:style>
+        <p:txBody>
+          <a:bodyPr rtlCol="0" anchor="ctr"/>
+          <a:lstStyle/>
+          <a:p>
+            <a:pPr algn="ctr"/>
+            <a:endParaRPr lang="en-US">
+              <a:solidFill>
+                <a:schemeClr val="tx1"/>
+              </a:solidFill>
+            </a:endParaRPr>
+          </a:p>
+        </p:txBody>
+      </p:sp>
+      <p:sp>
+        <p:nvSpPr>
+          <p:cNvPr id="3" name="Up Arrow 2"/>
+          <p:cNvSpPr/>
+          <p:nvPr/>
+        </p:nvSpPr>
+        <p:spPr>
+          <a:xfrm>
+            <a:off x="5338110" y="2033825"/>
+            <a:ext cx="249238" cy="1881926"/>
+          </a:xfrm>
+          <a:prstGeom prst="upArrow">
+            <a:avLst/>
+          </a:prstGeom>
+        </p:spPr>
+        <p:style>
+          <a:lnRef idx="2">
+            <a:schemeClr val="accent3">
+              <a:shade val="50000"/>
+            </a:schemeClr>
+          </a:lnRef>
+          <a:fillRef idx="1">
+            <a:schemeClr val="accent3"/>
+          </a:fillRef>
+          <a:effectRef idx="0">
+            <a:schemeClr val="accent3"/>
+          </a:effectRef>
+          <a:fontRef idx="minor">
+            <a:schemeClr val="lt1"/>
+          </a:fontRef>
+        </p:style>
+        <p:txBody>
+          <a:bodyPr rtlCol="0" anchor="ctr"/>
+          <a:lstStyle/>
+          <a:p>
+            <a:pPr algn="ctr"/>
+            <a:endParaRPr lang="en-US"/>
+          </a:p>
+        </p:txBody>
+      </p:sp>
+      <p:sp>
+        <p:nvSpPr>
+          <p:cNvPr id="27" name="กล่องข้อความ 19"/>
+          <p:cNvSpPr txBox="1"/>
+          <p:nvPr/>
+        </p:nvSpPr>
+        <p:spPr>
+          <a:xfrm>
+            <a:off x="4152121" y="3296038"/>
+            <a:ext cx="1526695" cy="523220"/>
+          </a:xfrm>
+          <a:prstGeom prst="rect">
+            <a:avLst/>
+          </a:prstGeom>
+          <a:noFill/>
+        </p:spPr>
+        <p:txBody>
+          <a:bodyPr wrap="square" rtlCol="0">
+            <a:spAutoFit/>
+          </a:bodyPr>
+          <a:lstStyle/>
+          <a:p>
+            <a:r>
+              <a:rPr lang="en-US" sz="1400" dirty="0" err="1" smtClean="0"/>
+              <a:t>toggle</a:t>
+            </a:r>
+            <a:r>
+              <a:rPr lang="en-US" sz="1400" dirty="0" err="1" smtClean="0"/>
+              <a:t>Todo</a:t>
+            </a:r>
+            <a:r>
+              <a:rPr lang="en-US" sz="1400" dirty="0" smtClean="0"/>
+              <a:t>(),</a:t>
+            </a:r>
+            <a:br>
+              <a:rPr lang="en-US" sz="1400" dirty="0" smtClean="0"/>
+            </a:br>
+            <a:r>
+              <a:rPr lang="en-US" sz="1400" dirty="0" err="1" smtClean="0"/>
+              <a:t>delete</a:t>
+            </a:r>
+            <a:r>
+              <a:rPr lang="en-US" sz="1400" dirty="0" err="1" smtClean="0"/>
+              <a:t>Todo</a:t>
+            </a:r>
+            <a:r>
+              <a:rPr lang="en-US" sz="1400" dirty="0" smtClean="0"/>
+              <a:t>()</a:t>
+            </a:r>
+            <a:endParaRPr lang="en-US" sz="1400" dirty="0"/>
+          </a:p>
+        </p:txBody>
+      </p:sp>
+      <p:sp>
+        <p:nvSpPr>
+          <p:cNvPr id="29" name="กล่องข้อความ 19"/>
+          <p:cNvSpPr txBox="1"/>
+          <p:nvPr/>
+        </p:nvSpPr>
+        <p:spPr>
+          <a:xfrm>
+            <a:off x="2028119" y="1108443"/>
+            <a:ext cx="1526695" cy="523220"/>
+          </a:xfrm>
+          <a:prstGeom prst="rect">
+            <a:avLst/>
+          </a:prstGeom>
+          <a:noFill/>
+        </p:spPr>
+        <p:txBody>
+          <a:bodyPr wrap="square" rtlCol="0">
+            <a:spAutoFit/>
+          </a:bodyPr>
+          <a:lstStyle/>
+          <a:p>
+            <a:r>
+              <a:rPr lang="en-US" sz="1400" dirty="0" err="1" smtClean="0"/>
+              <a:t>addTodo</a:t>
+            </a:r>
+            <a:r>
+              <a:rPr lang="en-US" sz="1400" dirty="0" smtClean="0"/>
+              <a:t>(),</a:t>
+            </a:r>
+            <a:br>
+              <a:rPr lang="en-US" sz="1400" dirty="0" smtClean="0"/>
+            </a:br>
+            <a:r>
+              <a:rPr lang="en-US" sz="1400" dirty="0" err="1" smtClean="0"/>
+              <a:t>updateNewTodo</a:t>
+            </a:r>
+            <a:r>
+              <a:rPr lang="en-US" sz="1400" dirty="0" smtClean="0"/>
+              <a:t>()</a:t>
+            </a:r>
+            <a:endParaRPr lang="en-US" sz="1400" dirty="0"/>
+          </a:p>
+        </p:txBody>
+      </p:sp>
+    </p:spTree>
+    <p:extLst>
+      <p:ext uri="{BB962C8B-B14F-4D97-AF65-F5344CB8AC3E}">
+        <p14:creationId xmlns:p14="http://schemas.microsoft.com/office/powerpoint/2010/main" val="812090366"/>
+      </p:ext>
+    </p:extLst>
+  </p:cSld>
+  <p:clrMapOvr>
+    <a:masterClrMapping/>
+  </p:clrMapOvr>
+  <p:timing>
+    <p:tnLst>
+      <p:par>
+        <p:cTn id="1" dur="indefinite" restart="never" nodeType="tmRoot"/>
+      </p:par>
+    </p:tnLst>
+  </p:timing>
 </p:sld>
 </file>
 

</xml_diff>